<commit_message>
chore: update slide deck
</commit_message>
<xml_diff>
--- a/APIBacklog/documentation/SupportingDocuments/others/cpe-management-api.pptx
+++ b/APIBacklog/documentation/SupportingDocuments/others/cpe-management-api.pptx
@@ -2,21 +2,25 @@
 <file path=ppt/presentation.xml><?xml version="1.0" encoding="utf-8"?>
 <p:presentation xmlns:a="http://schemas.openxmlformats.org/drawingml/2006/main" xmlns:r="http://schemas.openxmlformats.org/officeDocument/2006/relationships" xmlns:p="http://schemas.openxmlformats.org/presentationml/2006/main">
   <p:sldMasterIdLst>
-    <p:sldMasterId id="2147483648" r:id="rId1"/>
-    <p:sldMasterId id="2147483664" r:id="rId2"/>
+    <p:sldMasterId id="2147483648" r:id="rId4"/>
+    <p:sldMasterId id="2147483664" r:id="rId5"/>
   </p:sldMasterIdLst>
   <p:notesMasterIdLst>
-    <p:notesMasterId r:id="rId6"/>
+    <p:notesMasterId r:id="rId13"/>
   </p:notesMasterIdLst>
   <p:sldIdLst>
-    <p:sldId id="272" r:id="rId3"/>
-    <p:sldId id="316" r:id="rId4"/>
-    <p:sldId id="318" r:id="rId5"/>
+    <p:sldId id="272" r:id="rId6"/>
+    <p:sldId id="316" r:id="rId7"/>
+    <p:sldId id="318" r:id="rId8"/>
+    <p:sldId id="319" r:id="rId9"/>
+    <p:sldId id="321" r:id="rId10"/>
+    <p:sldId id="322" r:id="rId11"/>
+    <p:sldId id="323" r:id="rId12"/>
   </p:sldIdLst>
   <p:sldSz cx="12192000" cy="6858000"/>
   <p:notesSz cx="6858000" cy="9144000"/>
   <p:custDataLst>
-    <p:tags r:id="rId7"/>
+    <p:tags r:id="rId14"/>
   </p:custDataLst>
   <p:defaultTextStyle>
     <a:defPPr>
@@ -121,6 +125,12 @@
 </p:presentation>
 </file>
 
+<file path=ppt/authors.xml><?xml version="1.0" encoding="utf-8"?>
+<p188:authorLst xmlns:a="http://schemas.openxmlformats.org/drawingml/2006/main" xmlns:r="http://schemas.openxmlformats.org/officeDocument/2006/relationships" xmlns:p188="http://schemas.microsoft.com/office/powerpoint/2018/8/main">
+  <p188:author id="{31467D79-1616-4639-535C-08C7E550CFF6}" name="Page, Jason S" initials="PS" userId="S::jason.page@charter.com::45d8c7da-04e8-4598-9b6b-d26b7089572d" providerId="AD"/>
+</p188:authorLst>
+</file>
+
 <file path=ppt/commentAuthors.xml><?xml version="1.0" encoding="utf-8"?>
 <p:cmAuthorLst xmlns:a="http://schemas.openxmlformats.org/drawingml/2006/main" xmlns:r="http://schemas.openxmlformats.org/officeDocument/2006/relationships" xmlns:p="http://schemas.openxmlformats.org/presentationml/2006/main">
   <p:cmAuthor id="0" name="Mia Vida Villanueva" initials="MVV" lastIdx="1" clrIdx="0"/>
@@ -161,6 +171,15 @@
   <p:cmAuthor id="34" name="Jason" initials="J" lastIdx="18" clrIdx="33"/>
   <p:cmAuthor id="35" name="stephen" initials="s" lastIdx="1" clrIdx="34"/>
 </p:cmAuthorLst>
+</file>
+
+<file path=ppt/revisionInfo.xml><?xml version="1.0" encoding="utf-8"?>
+<p1510:revInfo xmlns:a="http://schemas.openxmlformats.org/drawingml/2006/main" xmlns:r="http://schemas.openxmlformats.org/officeDocument/2006/relationships" xmlns:p1510="http://schemas.microsoft.com/office/powerpoint/2015/10/main">
+  <p1510:revLst>
+    <p1510:client id="{7827627D-4031-2EAC-A5FD-A154D08C7828}" v="72" dt="2024-02-21T23:14:47.102"/>
+    <p1510:client id="{87C6654C-7A75-475B-BAFB-63F212C012C2}" v="19" dt="2024-02-21T23:10:04.999"/>
+  </p1510:revLst>
+</p1510:revInfo>
 </file>
 
 <file path=ppt/notesMasters/notesMaster1.xml><?xml version="1.0" encoding="utf-8"?>
@@ -245,7 +264,7 @@
           <a:p>
             <a:fld id="{185679B6-DFB9-465D-BCF7-63C3CDB22F53}" type="datetimeFigureOut">
               <a:rPr lang="zh-CN" altLang="en-US" smtClean="0"/>
-              <a:t>2024/1/24</a:t>
+              <a:t>2024/2/21</a:t>
             </a:fld>
             <a:endParaRPr lang="zh-CN" altLang="en-US"/>
           </a:p>
@@ -556,7 +575,7 @@
           <a:bodyPr/>
           <a:lstStyle/>
           <a:p>
-            <a:endParaRPr lang="en-US" altLang="zh-CN" baseline="0" dirty="0"/>
+            <a:endParaRPr lang="en-US" altLang="zh-CN" baseline="0"/>
           </a:p>
         </p:txBody>
       </p:sp>
@@ -640,7 +659,7 @@
           <a:bodyPr/>
           <a:lstStyle/>
           <a:p>
-            <a:endParaRPr lang="zh-CN" altLang="en-US" dirty="0"/>
+            <a:endParaRPr lang="zh-CN" altLang="en-US"/>
           </a:p>
         </p:txBody>
       </p:sp>
@@ -724,7 +743,7 @@
           <a:bodyPr/>
           <a:lstStyle/>
           <a:p>
-            <a:endParaRPr lang="zh-CN" altLang="en-US" dirty="0"/>
+            <a:endParaRPr lang="zh-CN" altLang="en-US"/>
           </a:p>
         </p:txBody>
       </p:sp>
@@ -755,6 +774,342 @@
     <p:extLst>
       <p:ext uri="{BB962C8B-B14F-4D97-AF65-F5344CB8AC3E}">
         <p14:creationId xmlns:p14="http://schemas.microsoft.com/office/powerpoint/2010/main" val="4098723248"/>
+      </p:ext>
+    </p:extLst>
+  </p:cSld>
+  <p:clrMapOvr>
+    <a:masterClrMapping/>
+  </p:clrMapOvr>
+</p:notes>
+</file>
+
+<file path=ppt/notesSlides/notesSlide4.xml><?xml version="1.0" encoding="utf-8"?>
+<p:notes xmlns:a="http://schemas.openxmlformats.org/drawingml/2006/main" xmlns:r="http://schemas.openxmlformats.org/officeDocument/2006/relationships" xmlns:p="http://schemas.openxmlformats.org/presentationml/2006/main">
+  <p:cSld>
+    <p:spTree>
+      <p:nvGrpSpPr>
+        <p:cNvPr id="1" name=""/>
+        <p:cNvGrpSpPr/>
+        <p:nvPr/>
+      </p:nvGrpSpPr>
+      <p:grpSpPr>
+        <a:xfrm>
+          <a:off x="0" y="0"/>
+          <a:ext cx="0" cy="0"/>
+          <a:chOff x="0" y="0"/>
+          <a:chExt cx="0" cy="0"/>
+        </a:xfrm>
+      </p:grpSpPr>
+      <p:sp>
+        <p:nvSpPr>
+          <p:cNvPr id="2" name="幻灯片图像占位符 1"/>
+          <p:cNvSpPr>
+            <a:spLocks noGrp="1" noRot="1" noChangeAspect="1"/>
+          </p:cNvSpPr>
+          <p:nvPr>
+            <p:ph type="sldImg"/>
+          </p:nvPr>
+        </p:nvSpPr>
+        <p:spPr/>
+      </p:sp>
+      <p:sp>
+        <p:nvSpPr>
+          <p:cNvPr id="3" name="备注占位符 2"/>
+          <p:cNvSpPr>
+            <a:spLocks noGrp="1"/>
+          </p:cNvSpPr>
+          <p:nvPr>
+            <p:ph type="body" idx="1"/>
+          </p:nvPr>
+        </p:nvSpPr>
+        <p:spPr/>
+        <p:txBody>
+          <a:bodyPr/>
+          <a:lstStyle/>
+          <a:p>
+            <a:endParaRPr lang="zh-CN" altLang="en-US"/>
+          </a:p>
+        </p:txBody>
+      </p:sp>
+      <p:sp>
+        <p:nvSpPr>
+          <p:cNvPr id="4" name="灯片编号占位符 3"/>
+          <p:cNvSpPr>
+            <a:spLocks noGrp="1"/>
+          </p:cNvSpPr>
+          <p:nvPr>
+            <p:ph type="sldNum" sz="quarter" idx="5"/>
+          </p:nvPr>
+        </p:nvSpPr>
+        <p:spPr/>
+        <p:txBody>
+          <a:bodyPr/>
+          <a:lstStyle/>
+          <a:p>
+            <a:fld id="{EEDDE9C1-3A93-4484-ADD9-54060A054C89}" type="slidenum">
+              <a:rPr lang="zh-CN" altLang="en-US" smtClean="0"/>
+              <a:t>4</a:t>
+            </a:fld>
+            <a:endParaRPr lang="zh-CN" altLang="en-US"/>
+          </a:p>
+        </p:txBody>
+      </p:sp>
+    </p:spTree>
+    <p:extLst>
+      <p:ext uri="{BB962C8B-B14F-4D97-AF65-F5344CB8AC3E}">
+        <p14:creationId xmlns:p14="http://schemas.microsoft.com/office/powerpoint/2010/main" val="1665304859"/>
+      </p:ext>
+    </p:extLst>
+  </p:cSld>
+  <p:clrMapOvr>
+    <a:masterClrMapping/>
+  </p:clrMapOvr>
+</p:notes>
+</file>
+
+<file path=ppt/notesSlides/notesSlide5.xml><?xml version="1.0" encoding="utf-8"?>
+<p:notes xmlns:a="http://schemas.openxmlformats.org/drawingml/2006/main" xmlns:r="http://schemas.openxmlformats.org/officeDocument/2006/relationships" xmlns:p="http://schemas.openxmlformats.org/presentationml/2006/main">
+  <p:cSld>
+    <p:spTree>
+      <p:nvGrpSpPr>
+        <p:cNvPr id="1" name=""/>
+        <p:cNvGrpSpPr/>
+        <p:nvPr/>
+      </p:nvGrpSpPr>
+      <p:grpSpPr>
+        <a:xfrm>
+          <a:off x="0" y="0"/>
+          <a:ext cx="0" cy="0"/>
+          <a:chOff x="0" y="0"/>
+          <a:chExt cx="0" cy="0"/>
+        </a:xfrm>
+      </p:grpSpPr>
+      <p:sp>
+        <p:nvSpPr>
+          <p:cNvPr id="2" name="幻灯片图像占位符 1"/>
+          <p:cNvSpPr>
+            <a:spLocks noGrp="1" noRot="1" noChangeAspect="1"/>
+          </p:cNvSpPr>
+          <p:nvPr>
+            <p:ph type="sldImg"/>
+          </p:nvPr>
+        </p:nvSpPr>
+        <p:spPr/>
+      </p:sp>
+      <p:sp>
+        <p:nvSpPr>
+          <p:cNvPr id="3" name="备注占位符 2"/>
+          <p:cNvSpPr>
+            <a:spLocks noGrp="1"/>
+          </p:cNvSpPr>
+          <p:nvPr>
+            <p:ph type="body" idx="1"/>
+          </p:nvPr>
+        </p:nvSpPr>
+        <p:spPr/>
+        <p:txBody>
+          <a:bodyPr/>
+          <a:lstStyle/>
+          <a:p>
+            <a:endParaRPr lang="zh-CN" altLang="en-US"/>
+          </a:p>
+        </p:txBody>
+      </p:sp>
+      <p:sp>
+        <p:nvSpPr>
+          <p:cNvPr id="4" name="灯片编号占位符 3"/>
+          <p:cNvSpPr>
+            <a:spLocks noGrp="1"/>
+          </p:cNvSpPr>
+          <p:nvPr>
+            <p:ph type="sldNum" sz="quarter" idx="5"/>
+          </p:nvPr>
+        </p:nvSpPr>
+        <p:spPr/>
+        <p:txBody>
+          <a:bodyPr/>
+          <a:lstStyle/>
+          <a:p>
+            <a:fld id="{EEDDE9C1-3A93-4484-ADD9-54060A054C89}" type="slidenum">
+              <a:rPr lang="zh-CN" altLang="en-US" smtClean="0"/>
+              <a:t>5</a:t>
+            </a:fld>
+            <a:endParaRPr lang="zh-CN" altLang="en-US"/>
+          </a:p>
+        </p:txBody>
+      </p:sp>
+    </p:spTree>
+    <p:extLst>
+      <p:ext uri="{BB962C8B-B14F-4D97-AF65-F5344CB8AC3E}">
+        <p14:creationId xmlns:p14="http://schemas.microsoft.com/office/powerpoint/2010/main" val="3652948052"/>
+      </p:ext>
+    </p:extLst>
+  </p:cSld>
+  <p:clrMapOvr>
+    <a:masterClrMapping/>
+  </p:clrMapOvr>
+</p:notes>
+</file>
+
+<file path=ppt/notesSlides/notesSlide6.xml><?xml version="1.0" encoding="utf-8"?>
+<p:notes xmlns:a="http://schemas.openxmlformats.org/drawingml/2006/main" xmlns:r="http://schemas.openxmlformats.org/officeDocument/2006/relationships" xmlns:p="http://schemas.openxmlformats.org/presentationml/2006/main">
+  <p:cSld>
+    <p:spTree>
+      <p:nvGrpSpPr>
+        <p:cNvPr id="1" name=""/>
+        <p:cNvGrpSpPr/>
+        <p:nvPr/>
+      </p:nvGrpSpPr>
+      <p:grpSpPr>
+        <a:xfrm>
+          <a:off x="0" y="0"/>
+          <a:ext cx="0" cy="0"/>
+          <a:chOff x="0" y="0"/>
+          <a:chExt cx="0" cy="0"/>
+        </a:xfrm>
+      </p:grpSpPr>
+      <p:sp>
+        <p:nvSpPr>
+          <p:cNvPr id="2" name="幻灯片图像占位符 1"/>
+          <p:cNvSpPr>
+            <a:spLocks noGrp="1" noRot="1" noChangeAspect="1"/>
+          </p:cNvSpPr>
+          <p:nvPr>
+            <p:ph type="sldImg"/>
+          </p:nvPr>
+        </p:nvSpPr>
+        <p:spPr/>
+      </p:sp>
+      <p:sp>
+        <p:nvSpPr>
+          <p:cNvPr id="3" name="备注占位符 2"/>
+          <p:cNvSpPr>
+            <a:spLocks noGrp="1"/>
+          </p:cNvSpPr>
+          <p:nvPr>
+            <p:ph type="body" idx="1"/>
+          </p:nvPr>
+        </p:nvSpPr>
+        <p:spPr/>
+        <p:txBody>
+          <a:bodyPr/>
+          <a:lstStyle/>
+          <a:p>
+            <a:endParaRPr lang="zh-CN" altLang="en-US"/>
+          </a:p>
+        </p:txBody>
+      </p:sp>
+      <p:sp>
+        <p:nvSpPr>
+          <p:cNvPr id="4" name="灯片编号占位符 3"/>
+          <p:cNvSpPr>
+            <a:spLocks noGrp="1"/>
+          </p:cNvSpPr>
+          <p:nvPr>
+            <p:ph type="sldNum" sz="quarter" idx="5"/>
+          </p:nvPr>
+        </p:nvSpPr>
+        <p:spPr/>
+        <p:txBody>
+          <a:bodyPr/>
+          <a:lstStyle/>
+          <a:p>
+            <a:fld id="{EEDDE9C1-3A93-4484-ADD9-54060A054C89}" type="slidenum">
+              <a:rPr lang="zh-CN" altLang="en-US" smtClean="0"/>
+              <a:t>6</a:t>
+            </a:fld>
+            <a:endParaRPr lang="zh-CN" altLang="en-US"/>
+          </a:p>
+        </p:txBody>
+      </p:sp>
+    </p:spTree>
+    <p:extLst>
+      <p:ext uri="{BB962C8B-B14F-4D97-AF65-F5344CB8AC3E}">
+        <p14:creationId xmlns:p14="http://schemas.microsoft.com/office/powerpoint/2010/main" val="2379857005"/>
+      </p:ext>
+    </p:extLst>
+  </p:cSld>
+  <p:clrMapOvr>
+    <a:masterClrMapping/>
+  </p:clrMapOvr>
+</p:notes>
+</file>
+
+<file path=ppt/notesSlides/notesSlide7.xml><?xml version="1.0" encoding="utf-8"?>
+<p:notes xmlns:a="http://schemas.openxmlformats.org/drawingml/2006/main" xmlns:r="http://schemas.openxmlformats.org/officeDocument/2006/relationships" xmlns:p="http://schemas.openxmlformats.org/presentationml/2006/main">
+  <p:cSld>
+    <p:spTree>
+      <p:nvGrpSpPr>
+        <p:cNvPr id="1" name=""/>
+        <p:cNvGrpSpPr/>
+        <p:nvPr/>
+      </p:nvGrpSpPr>
+      <p:grpSpPr>
+        <a:xfrm>
+          <a:off x="0" y="0"/>
+          <a:ext cx="0" cy="0"/>
+          <a:chOff x="0" y="0"/>
+          <a:chExt cx="0" cy="0"/>
+        </a:xfrm>
+      </p:grpSpPr>
+      <p:sp>
+        <p:nvSpPr>
+          <p:cNvPr id="2" name="幻灯片图像占位符 1"/>
+          <p:cNvSpPr>
+            <a:spLocks noGrp="1" noRot="1" noChangeAspect="1"/>
+          </p:cNvSpPr>
+          <p:nvPr>
+            <p:ph type="sldImg"/>
+          </p:nvPr>
+        </p:nvSpPr>
+        <p:spPr/>
+      </p:sp>
+      <p:sp>
+        <p:nvSpPr>
+          <p:cNvPr id="3" name="备注占位符 2"/>
+          <p:cNvSpPr>
+            <a:spLocks noGrp="1"/>
+          </p:cNvSpPr>
+          <p:nvPr>
+            <p:ph type="body" idx="1"/>
+          </p:nvPr>
+        </p:nvSpPr>
+        <p:spPr/>
+        <p:txBody>
+          <a:bodyPr/>
+          <a:lstStyle/>
+          <a:p>
+            <a:endParaRPr lang="zh-CN" altLang="en-US"/>
+          </a:p>
+        </p:txBody>
+      </p:sp>
+      <p:sp>
+        <p:nvSpPr>
+          <p:cNvPr id="4" name="灯片编号占位符 3"/>
+          <p:cNvSpPr>
+            <a:spLocks noGrp="1"/>
+          </p:cNvSpPr>
+          <p:nvPr>
+            <p:ph type="sldNum" sz="quarter" idx="5"/>
+          </p:nvPr>
+        </p:nvSpPr>
+        <p:spPr/>
+        <p:txBody>
+          <a:bodyPr/>
+          <a:lstStyle/>
+          <a:p>
+            <a:fld id="{EEDDE9C1-3A93-4484-ADD9-54060A054C89}" type="slidenum">
+              <a:rPr lang="zh-CN" altLang="en-US" smtClean="0"/>
+              <a:t>7</a:t>
+            </a:fld>
+            <a:endParaRPr lang="zh-CN" altLang="en-US"/>
+          </a:p>
+        </p:txBody>
+      </p:sp>
+    </p:spTree>
+    <p:extLst>
+      <p:ext uri="{BB962C8B-B14F-4D97-AF65-F5344CB8AC3E}">
+        <p14:creationId xmlns:p14="http://schemas.microsoft.com/office/powerpoint/2010/main" val="3740332220"/>
       </p:ext>
     </p:extLst>
   </p:cSld>
@@ -893,7 +1248,7 @@
           <a:p>
             <a:fld id="{3F6070F3-CE90-48C4-9164-61E1D2692451}" type="datetimeFigureOut">
               <a:rPr lang="zh-CN" altLang="en-US" smtClean="0"/>
-              <a:t>2024/1/24</a:t>
+              <a:t>2024/2/21</a:t>
             </a:fld>
             <a:endParaRPr lang="zh-CN" altLang="en-US"/>
           </a:p>
@@ -1056,7 +1411,7 @@
           <a:p>
             <a:fld id="{3F6070F3-CE90-48C4-9164-61E1D2692451}" type="datetimeFigureOut">
               <a:rPr lang="zh-CN" altLang="en-US" smtClean="0"/>
-              <a:t>2024/1/24</a:t>
+              <a:t>2024/2/21</a:t>
             </a:fld>
             <a:endParaRPr lang="zh-CN" altLang="en-US"/>
           </a:p>
@@ -1229,7 +1584,7 @@
           <a:p>
             <a:fld id="{3F6070F3-CE90-48C4-9164-61E1D2692451}" type="datetimeFigureOut">
               <a:rPr lang="zh-CN" altLang="en-US" smtClean="0"/>
-              <a:t>2024/1/24</a:t>
+              <a:t>2024/2/21</a:t>
             </a:fld>
             <a:endParaRPr lang="zh-CN" altLang="en-US"/>
           </a:p>
@@ -1336,7 +1691,7 @@
                   <p:embed/>
                   <p:pic>
                     <p:nvPicPr>
-                      <p:cNvPr id="0" name="图片 1053"/>
+                      <p:cNvPr id="6" name="Objekt 5" hidden="1"/>
                       <p:cNvPicPr/>
                       <p:nvPr/>
                     </p:nvPicPr>
@@ -1443,7 +1798,7 @@
           </a:lstStyle>
           <a:p>
             <a:r>
-              <a:rPr lang="en-US" sz="2540" dirty="0">
+              <a:rPr lang="en-US" sz="2540">
                 <a:solidFill>
                   <a:schemeClr val="bg1"/>
                 </a:solidFill>
@@ -1451,14 +1806,14 @@
               <a:t>Slide</a:t>
             </a:r>
             <a:br>
-              <a:rPr lang="en-US" sz="2540" dirty="0">
+              <a:rPr lang="en-US" sz="2540">
                 <a:solidFill>
                   <a:schemeClr val="bg1"/>
                 </a:solidFill>
               </a:rPr>
             </a:br>
             <a:r>
-              <a:rPr lang="en-US" sz="2540" dirty="0">
+              <a:rPr lang="en-US" sz="2540">
                 <a:solidFill>
                   <a:schemeClr val="bg1"/>
                 </a:solidFill>
@@ -1562,7 +1917,7 @@
               <a:rPr lang="zh-CN" altLang="en-US"/>
               <a:t>第五级</a:t>
             </a:r>
-            <a:endParaRPr lang="en-US" dirty="0"/>
+            <a:endParaRPr lang="en-US"/>
           </a:p>
         </p:txBody>
       </p:sp>
@@ -1634,7 +1989,7 @@
                   <p:embed/>
                   <p:pic>
                     <p:nvPicPr>
-                      <p:cNvPr id="0" name="Objekt 4" hidden="1"/>
+                      <p:cNvPr id="5" name="Objekt 4" hidden="1"/>
                       <p:cNvPicPr/>
                       <p:nvPr/>
                     </p:nvPicPr>
@@ -1729,32 +2084,32 @@
           <a:p>
             <a:pPr lvl="0"/>
             <a:r>
-              <a:rPr lang="de-DE" dirty="0"/>
+              <a:rPr lang="de-DE"/>
               <a:t>Montserrat Light</a:t>
             </a:r>
             <a:br>
-              <a:rPr lang="de-DE" dirty="0"/>
+              <a:rPr lang="de-DE"/>
             </a:br>
             <a:r>
-              <a:rPr lang="de-DE" dirty="0"/>
+              <a:rPr lang="de-DE"/>
               <a:t>Maximum 3 </a:t>
             </a:r>
             <a:r>
-              <a:rPr lang="de-DE" dirty="0" err="1"/>
+              <a:rPr lang="de-DE" err="1"/>
               <a:t>lines</a:t>
             </a:r>
             <a:br>
-              <a:rPr lang="de-DE" dirty="0"/>
+              <a:rPr lang="de-DE"/>
             </a:br>
             <a:r>
-              <a:rPr lang="de-DE" dirty="0"/>
+              <a:rPr lang="de-DE"/>
               <a:t>44 </a:t>
             </a:r>
             <a:r>
-              <a:rPr lang="de-DE" dirty="0" err="1"/>
+              <a:rPr lang="de-DE" err="1"/>
               <a:t>pt</a:t>
             </a:r>
-            <a:endParaRPr lang="de-DE" dirty="0"/>
+            <a:endParaRPr lang="de-DE"/>
           </a:p>
         </p:txBody>
       </p:sp>
@@ -1801,18 +2156,18 @@
           <a:p>
             <a:pPr lvl="0"/>
             <a:r>
-              <a:rPr lang="de-DE" dirty="0" err="1"/>
+              <a:rPr lang="de-DE" err="1"/>
               <a:t>Subheading</a:t>
             </a:r>
             <a:r>
-              <a:rPr lang="de-DE" dirty="0"/>
+              <a:rPr lang="de-DE"/>
               <a:t> Montserrat Light, 20 </a:t>
             </a:r>
             <a:r>
-              <a:rPr lang="de-DE" dirty="0" err="1"/>
+              <a:rPr lang="de-DE" err="1"/>
               <a:t>pt</a:t>
             </a:r>
-            <a:endParaRPr lang="de-DE" dirty="0"/>
+            <a:endParaRPr lang="de-DE"/>
           </a:p>
         </p:txBody>
       </p:sp>
@@ -3103,7 +3458,7 @@
                   <p:embed/>
                   <p:pic>
                     <p:nvPicPr>
-                      <p:cNvPr id="0" name="Objekt 4" hidden="1"/>
+                      <p:cNvPr id="5" name="Objekt 4" hidden="1"/>
                       <p:cNvPicPr/>
                       <p:nvPr/>
                     </p:nvPicPr>
@@ -3198,11 +3553,11 @@
           <a:p>
             <a:pPr lvl="0"/>
             <a:r>
-              <a:rPr lang="de-DE" dirty="0" err="1"/>
+              <a:rPr lang="de-DE" err="1"/>
               <a:t>Section</a:t>
             </a:r>
             <a:r>
-              <a:rPr lang="de-DE" dirty="0"/>
+              <a:rPr lang="de-DE"/>
               <a:t> Title</a:t>
             </a:r>
           </a:p>
@@ -4439,10 +4794,10 @@
           </a:lstStyle>
           <a:p>
             <a:r>
-              <a:rPr lang="zh-CN" altLang="en-US" dirty="0"/>
+              <a:rPr lang="zh-CN" altLang="en-US"/>
               <a:t>单击此处添加标题</a:t>
             </a:r>
-            <a:endParaRPr lang="en-US" dirty="0"/>
+            <a:endParaRPr lang="en-US"/>
           </a:p>
         </p:txBody>
       </p:sp>
@@ -4569,10 +4924,10 @@
           <a:p>
             <a:pPr lvl="0"/>
             <a:r>
-              <a:rPr lang="zh-CN" altLang="en-US" dirty="0"/>
+              <a:rPr lang="zh-CN" altLang="en-US"/>
               <a:t>单击此处添加文本</a:t>
             </a:r>
-            <a:endParaRPr lang="en-US" altLang="zh-CN" dirty="0"/>
+            <a:endParaRPr lang="en-US" altLang="zh-CN"/>
           </a:p>
         </p:txBody>
       </p:sp>
@@ -4650,7 +5005,7 @@
           <a:p>
             <a:pPr defTabSz="914112"/>
             <a:r>
-              <a:rPr kumimoji="1" lang="zh-CN" altLang="en-US" sz="3598" dirty="0">
+              <a:rPr kumimoji="1" lang="zh-CN" altLang="en-US" sz="3598">
                 <a:solidFill>
                   <a:srgbClr val="1D1D1A"/>
                 </a:solidFill>
@@ -4783,7 +5138,7 @@
           <a:p>
             <a:fld id="{3F6070F3-CE90-48C4-9164-61E1D2692451}" type="datetimeFigureOut">
               <a:rPr lang="zh-CN" altLang="en-US" smtClean="0"/>
-              <a:t>2024/1/24</a:t>
+              <a:t>2024/2/21</a:t>
             </a:fld>
             <a:endParaRPr lang="zh-CN" altLang="en-US"/>
           </a:p>
@@ -5023,7 +5378,7 @@
           <a:p>
             <a:fld id="{3F6070F3-CE90-48C4-9164-61E1D2692451}" type="datetimeFigureOut">
               <a:rPr lang="zh-CN" altLang="en-US" smtClean="0"/>
-              <a:t>2024/1/24</a:t>
+              <a:t>2024/2/21</a:t>
             </a:fld>
             <a:endParaRPr lang="zh-CN" altLang="en-US"/>
           </a:p>
@@ -5247,7 +5602,7 @@
           <a:p>
             <a:fld id="{3F6070F3-CE90-48C4-9164-61E1D2692451}" type="datetimeFigureOut">
               <a:rPr lang="zh-CN" altLang="en-US" smtClean="0"/>
-              <a:t>2024/1/24</a:t>
+              <a:t>2024/2/21</a:t>
             </a:fld>
             <a:endParaRPr lang="zh-CN" altLang="en-US"/>
           </a:p>
@@ -5606,7 +5961,7 @@
           <a:p>
             <a:fld id="{3F6070F3-CE90-48C4-9164-61E1D2692451}" type="datetimeFigureOut">
               <a:rPr lang="zh-CN" altLang="en-US" smtClean="0"/>
-              <a:t>2024/1/24</a:t>
+              <a:t>2024/2/21</a:t>
             </a:fld>
             <a:endParaRPr lang="zh-CN" altLang="en-US"/>
           </a:p>
@@ -5718,7 +6073,7 @@
           <a:p>
             <a:fld id="{3F6070F3-CE90-48C4-9164-61E1D2692451}" type="datetimeFigureOut">
               <a:rPr lang="zh-CN" altLang="en-US" smtClean="0"/>
-              <a:t>2024/1/24</a:t>
+              <a:t>2024/2/21</a:t>
             </a:fld>
             <a:endParaRPr lang="zh-CN" altLang="en-US"/>
           </a:p>
@@ -5808,7 +6163,7 @@
           <a:p>
             <a:fld id="{3F6070F3-CE90-48C4-9164-61E1D2692451}" type="datetimeFigureOut">
               <a:rPr lang="zh-CN" altLang="en-US" smtClean="0"/>
-              <a:t>2024/1/24</a:t>
+              <a:t>2024/2/21</a:t>
             </a:fld>
             <a:endParaRPr lang="zh-CN" altLang="en-US"/>
           </a:p>
@@ -6078,7 +6433,7 @@
           <a:p>
             <a:fld id="{3F6070F3-CE90-48C4-9164-61E1D2692451}" type="datetimeFigureOut">
               <a:rPr lang="zh-CN" altLang="en-US" smtClean="0"/>
-              <a:t>2024/1/24</a:t>
+              <a:t>2024/2/21</a:t>
             </a:fld>
             <a:endParaRPr lang="zh-CN" altLang="en-US"/>
           </a:p>
@@ -6325,7 +6680,7 @@
           <a:p>
             <a:fld id="{3F6070F3-CE90-48C4-9164-61E1D2692451}" type="datetimeFigureOut">
               <a:rPr lang="zh-CN" altLang="en-US" smtClean="0"/>
-              <a:t>2024/1/24</a:t>
+              <a:t>2024/2/21</a:t>
             </a:fld>
             <a:endParaRPr lang="zh-CN" altLang="en-US"/>
           </a:p>
@@ -6531,7 +6886,7 @@
           <a:p>
             <a:fld id="{3F6070F3-CE90-48C4-9164-61E1D2692451}" type="datetimeFigureOut">
               <a:rPr lang="zh-CN" altLang="en-US" smtClean="0"/>
-              <a:t>2024/1/24</a:t>
+              <a:t>2024/2/21</a:t>
             </a:fld>
             <a:endParaRPr lang="zh-CN" altLang="en-US"/>
           </a:p>
@@ -6986,7 +7341,7 @@
               </a:pPr>
               <a:t>‹#›</a:t>
             </a:fld>
-            <a:endParaRPr lang="en-US" sz="900" dirty="0">
+            <a:endParaRPr lang="en-US" sz="900">
               <a:solidFill>
                 <a:srgbClr val="1D1D1B"/>
               </a:solidFill>
@@ -7071,7 +7426,7 @@
                 </a:lnSpc>
               </a:pPr>
               <a:r>
-                <a:rPr kumimoji="1" lang="en-US" altLang="zh-CN" sz="500" b="1" dirty="0">
+                <a:rPr kumimoji="1" lang="en-US" altLang="zh-CN" sz="500" b="1">
                   <a:solidFill>
                     <a:srgbClr val="FFFFFF"/>
                   </a:solidFill>
@@ -7082,7 +7437,7 @@
                 <a:t>RGB</a:t>
               </a:r>
               <a:br>
-                <a:rPr kumimoji="1" lang="en-US" altLang="zh-CN" sz="500" b="1" dirty="0">
+                <a:rPr kumimoji="1" lang="en-US" altLang="zh-CN" sz="500" b="1">
                   <a:solidFill>
                     <a:srgbClr val="FFFFFF"/>
                   </a:solidFill>
@@ -7092,7 +7447,7 @@
                 </a:rPr>
               </a:br>
               <a:r>
-                <a:rPr kumimoji="1" lang="en-US" altLang="zh-CN" sz="500" b="1" dirty="0">
+                <a:rPr kumimoji="1" lang="en-US" altLang="zh-CN" sz="500" b="1">
                   <a:solidFill>
                     <a:srgbClr val="FFFFFF"/>
                   </a:solidFill>
@@ -7135,7 +7490,7 @@
             <a:p>
               <a:pPr defTabSz="914112"/>
               <a:r>
-                <a:rPr kumimoji="1" lang="zh-CN" altLang="en-US" sz="800" dirty="0">
+                <a:rPr kumimoji="1" lang="zh-CN" altLang="en-US" sz="800">
                   <a:solidFill>
                     <a:srgbClr val="1D1D1A"/>
                   </a:solidFill>
@@ -7200,7 +7555,7 @@
                 </a:lnSpc>
               </a:pPr>
               <a:r>
-                <a:rPr kumimoji="1" lang="en-US" altLang="zh-CN" sz="500" b="1" dirty="0">
+                <a:rPr kumimoji="1" lang="en-US" altLang="zh-CN" sz="500" b="1">
                   <a:solidFill>
                     <a:srgbClr val="FFFFFF"/>
                   </a:solidFill>
@@ -7211,7 +7566,7 @@
                 <a:t>RGB</a:t>
               </a:r>
               <a:br>
-                <a:rPr kumimoji="1" lang="en-US" altLang="zh-CN" sz="500" b="1" dirty="0">
+                <a:rPr kumimoji="1" lang="en-US" altLang="zh-CN" sz="500" b="1">
                   <a:solidFill>
                     <a:srgbClr val="FFFFFF"/>
                   </a:solidFill>
@@ -7221,7 +7576,7 @@
                 </a:rPr>
               </a:br>
               <a:r>
-                <a:rPr kumimoji="1" lang="en-US" altLang="zh-CN" sz="500" b="1" dirty="0">
+                <a:rPr kumimoji="1" lang="en-US" altLang="zh-CN" sz="500" b="1">
                   <a:solidFill>
                     <a:srgbClr val="FFFFFF"/>
                   </a:solidFill>
@@ -7287,7 +7642,7 @@
                 </a:lnSpc>
               </a:pPr>
               <a:r>
-                <a:rPr kumimoji="1" lang="en-US" altLang="zh-CN" sz="500" b="1" dirty="0">
+                <a:rPr kumimoji="1" lang="en-US" altLang="zh-CN" sz="500" b="1">
                   <a:solidFill>
                     <a:srgbClr val="FFFFFF"/>
                   </a:solidFill>
@@ -7298,7 +7653,7 @@
                 <a:t>RGB</a:t>
               </a:r>
               <a:br>
-                <a:rPr kumimoji="1" lang="en-US" altLang="zh-CN" sz="500" b="1" dirty="0">
+                <a:rPr kumimoji="1" lang="en-US" altLang="zh-CN" sz="500" b="1">
                   <a:solidFill>
                     <a:srgbClr val="FFFFFF"/>
                   </a:solidFill>
@@ -7308,7 +7663,7 @@
                 </a:rPr>
               </a:br>
               <a:r>
-                <a:rPr kumimoji="1" lang="en-US" altLang="zh-CN" sz="500" b="1" dirty="0">
+                <a:rPr kumimoji="1" lang="en-US" altLang="zh-CN" sz="500" b="1">
                   <a:solidFill>
                     <a:srgbClr val="FFFFFF"/>
                   </a:solidFill>
@@ -7375,7 +7730,7 @@
                 <a:defRPr/>
               </a:pPr>
               <a:r>
-                <a:rPr kumimoji="1" lang="en-US" altLang="zh-CN" sz="500" b="1" dirty="0">
+                <a:rPr kumimoji="1" lang="en-US" altLang="zh-CN" sz="500" b="1">
                   <a:solidFill>
                     <a:srgbClr val="FFFFFF"/>
                   </a:solidFill>
@@ -7386,7 +7741,7 @@
                 <a:t>RGB</a:t>
               </a:r>
               <a:br>
-                <a:rPr kumimoji="1" lang="en-US" altLang="zh-CN" sz="500" b="1" dirty="0">
+                <a:rPr kumimoji="1" lang="en-US" altLang="zh-CN" sz="500" b="1">
                   <a:solidFill>
                     <a:srgbClr val="FFFFFF"/>
                   </a:solidFill>
@@ -7396,7 +7751,7 @@
                 </a:rPr>
               </a:br>
               <a:r>
-                <a:rPr kumimoji="1" lang="en-US" altLang="zh-CN" sz="500" b="1" dirty="0">
+                <a:rPr kumimoji="1" lang="en-US" altLang="zh-CN" sz="500" b="1">
                   <a:solidFill>
                     <a:srgbClr val="FFFFFF"/>
                   </a:solidFill>
@@ -7462,7 +7817,7 @@
                 </a:lnSpc>
               </a:pPr>
               <a:r>
-                <a:rPr kumimoji="1" lang="en-US" altLang="zh-CN" sz="500" b="1" dirty="0">
+                <a:rPr kumimoji="1" lang="en-US" altLang="zh-CN" sz="500" b="1">
                   <a:solidFill>
                     <a:srgbClr val="FFFFFF"/>
                   </a:solidFill>
@@ -7473,7 +7828,7 @@
                 <a:t>RGB </a:t>
               </a:r>
               <a:br>
-                <a:rPr kumimoji="1" lang="en-US" altLang="zh-CN" sz="500" b="1" dirty="0">
+                <a:rPr kumimoji="1" lang="en-US" altLang="zh-CN" sz="500" b="1">
                   <a:solidFill>
                     <a:srgbClr val="FFFFFF"/>
                   </a:solidFill>
@@ -7483,7 +7838,7 @@
                 </a:rPr>
               </a:br>
               <a:r>
-                <a:rPr kumimoji="1" lang="en-US" altLang="zh-CN" sz="500" b="1" dirty="0">
+                <a:rPr kumimoji="1" lang="en-US" altLang="zh-CN" sz="500" b="1">
                   <a:solidFill>
                     <a:srgbClr val="FFFFFF"/>
                   </a:solidFill>
@@ -7549,7 +7904,7 @@
                 </a:lnSpc>
               </a:pPr>
               <a:r>
-                <a:rPr kumimoji="1" lang="en-US" altLang="zh-CN" sz="500" b="1" dirty="0">
+                <a:rPr kumimoji="1" lang="en-US" altLang="zh-CN" sz="500" b="1">
                   <a:solidFill>
                     <a:srgbClr val="FFFFFF"/>
                   </a:solidFill>
@@ -7560,7 +7915,7 @@
                 <a:t>RGB</a:t>
               </a:r>
               <a:br>
-                <a:rPr kumimoji="1" lang="en-US" altLang="zh-CN" sz="500" b="1" dirty="0">
+                <a:rPr kumimoji="1" lang="en-US" altLang="zh-CN" sz="500" b="1">
                   <a:solidFill>
                     <a:srgbClr val="FFFFFF"/>
                   </a:solidFill>
@@ -7570,7 +7925,7 @@
                 </a:rPr>
               </a:br>
               <a:r>
-                <a:rPr kumimoji="1" lang="en-US" altLang="zh-CN" sz="500" b="1" dirty="0">
+                <a:rPr kumimoji="1" lang="en-US" altLang="zh-CN" sz="500" b="1">
                   <a:solidFill>
                     <a:srgbClr val="FFFFFF"/>
                   </a:solidFill>
@@ -7580,7 +7935,7 @@
                 </a:rPr>
                 <a:t>242/137/68</a:t>
               </a:r>
-              <a:endParaRPr kumimoji="1" lang="mr-IN" altLang="zh-CN" sz="500" b="1" dirty="0">
+              <a:endParaRPr kumimoji="1" lang="mr-IN" altLang="zh-CN" sz="500" b="1">
                 <a:solidFill>
                   <a:srgbClr val="FFFFFF"/>
                 </a:solidFill>
@@ -7644,7 +7999,7 @@
                 </a:lnSpc>
               </a:pPr>
               <a:r>
-                <a:rPr kumimoji="1" lang="en-US" altLang="zh-CN" sz="500" b="1" dirty="0">
+                <a:rPr kumimoji="1" lang="en-US" altLang="zh-CN" sz="500" b="1">
                   <a:solidFill>
                     <a:srgbClr val="FFFFFF"/>
                   </a:solidFill>
@@ -7662,7 +8017,7 @@
                 </a:lnSpc>
               </a:pPr>
               <a:r>
-                <a:rPr kumimoji="1" lang="en-US" altLang="zh-CN" sz="500" b="1" dirty="0">
+                <a:rPr kumimoji="1" lang="en-US" altLang="zh-CN" sz="500" b="1">
                   <a:solidFill>
                     <a:srgbClr val="FFFFFF"/>
                   </a:solidFill>
@@ -7673,7 +8028,7 @@
                 <a:t>RGB </a:t>
               </a:r>
               <a:br>
-                <a:rPr kumimoji="1" lang="en-US" altLang="zh-CN" sz="500" b="1" dirty="0">
+                <a:rPr kumimoji="1" lang="en-US" altLang="zh-CN" sz="500" b="1">
                   <a:solidFill>
                     <a:srgbClr val="FFFFFF"/>
                   </a:solidFill>
@@ -7683,7 +8038,7 @@
                 </a:rPr>
               </a:br>
               <a:r>
-                <a:rPr kumimoji="1" lang="en-US" altLang="zh-CN" sz="500" b="1" dirty="0">
+                <a:rPr kumimoji="1" lang="en-US" altLang="zh-CN" sz="500" b="1">
                   <a:solidFill>
                     <a:srgbClr val="FFFFFF"/>
                   </a:solidFill>
@@ -7726,7 +8081,7 @@
             <a:p>
               <a:pPr defTabSz="914112"/>
               <a:r>
-                <a:rPr kumimoji="1" lang="zh-CN" altLang="en-US" sz="800" dirty="0">
+                <a:rPr kumimoji="1" lang="zh-CN" altLang="en-US" sz="800">
                   <a:solidFill>
                     <a:srgbClr val="1D1D1A"/>
                   </a:solidFill>
@@ -7791,7 +8146,7 @@
                 </a:lnSpc>
               </a:pPr>
               <a:r>
-                <a:rPr kumimoji="1" lang="en-US" altLang="zh-CN" sz="500" b="1" dirty="0">
+                <a:rPr kumimoji="1" lang="en-US" altLang="zh-CN" sz="500" b="1">
                   <a:solidFill>
                     <a:srgbClr val="FFFFFF"/>
                   </a:solidFill>
@@ -7809,7 +8164,7 @@
                 </a:lnSpc>
               </a:pPr>
               <a:r>
-                <a:rPr kumimoji="1" lang="en-US" altLang="zh-CN" sz="500" b="1" dirty="0">
+                <a:rPr kumimoji="1" lang="en-US" altLang="zh-CN" sz="500" b="1">
                   <a:solidFill>
                     <a:srgbClr val="FFFFFF"/>
                   </a:solidFill>
@@ -7820,7 +8175,7 @@
                 <a:t>RGB</a:t>
               </a:r>
               <a:br>
-                <a:rPr kumimoji="1" lang="en-US" altLang="zh-CN" sz="500" b="1" dirty="0">
+                <a:rPr kumimoji="1" lang="en-US" altLang="zh-CN" sz="500" b="1">
                   <a:solidFill>
                     <a:srgbClr val="FFFFFF"/>
                   </a:solidFill>
@@ -7830,7 +8185,7 @@
                 </a:rPr>
               </a:br>
               <a:r>
-                <a:rPr kumimoji="1" lang="en-US" altLang="zh-CN" sz="500" b="1" dirty="0">
+                <a:rPr kumimoji="1" lang="en-US" altLang="zh-CN" sz="500" b="1">
                   <a:solidFill>
                     <a:srgbClr val="FFFFFF"/>
                   </a:solidFill>
@@ -7896,7 +8251,7 @@
                 </a:lnSpc>
               </a:pPr>
               <a:r>
-                <a:rPr kumimoji="1" lang="en-US" altLang="zh-CN" sz="500" b="1" dirty="0">
+                <a:rPr kumimoji="1" lang="en-US" altLang="zh-CN" sz="500" b="1">
                   <a:solidFill>
                     <a:srgbClr val="FFFFFF"/>
                   </a:solidFill>
@@ -7907,7 +8262,7 @@
                 <a:t>RGB</a:t>
               </a:r>
               <a:br>
-                <a:rPr kumimoji="1" lang="en-US" altLang="zh-CN" sz="500" b="1" dirty="0">
+                <a:rPr kumimoji="1" lang="en-US" altLang="zh-CN" sz="500" b="1">
                   <a:solidFill>
                     <a:srgbClr val="FFFFFF"/>
                   </a:solidFill>
@@ -7917,7 +8272,7 @@
                 </a:rPr>
               </a:br>
               <a:r>
-                <a:rPr kumimoji="1" lang="en-US" altLang="zh-CN" sz="500" b="1" dirty="0">
+                <a:rPr kumimoji="1" lang="en-US" altLang="zh-CN" sz="500" b="1">
                   <a:solidFill>
                     <a:srgbClr val="FFFFFF"/>
                   </a:solidFill>
@@ -7983,7 +8338,7 @@
                 </a:lnSpc>
               </a:pPr>
               <a:r>
-                <a:rPr kumimoji="1" lang="en-US" altLang="zh-CN" sz="500" b="1" dirty="0">
+                <a:rPr kumimoji="1" lang="en-US" altLang="zh-CN" sz="500" b="1">
                   <a:solidFill>
                     <a:srgbClr val="FFFFFF"/>
                   </a:solidFill>
@@ -7994,7 +8349,7 @@
                 <a:t>RGB</a:t>
               </a:r>
               <a:br>
-                <a:rPr kumimoji="1" lang="en-US" altLang="zh-CN" sz="500" b="1" dirty="0">
+                <a:rPr kumimoji="1" lang="en-US" altLang="zh-CN" sz="500" b="1">
                   <a:solidFill>
                     <a:srgbClr val="FFFFFF"/>
                   </a:solidFill>
@@ -8004,7 +8359,7 @@
                 </a:rPr>
               </a:br>
               <a:r>
-                <a:rPr kumimoji="1" lang="en-US" altLang="zh-CN" sz="500" b="1" dirty="0">
+                <a:rPr kumimoji="1" lang="en-US" altLang="zh-CN" sz="500" b="1">
                   <a:solidFill>
                     <a:srgbClr val="FFFFFF"/>
                   </a:solidFill>
@@ -8070,7 +8425,7 @@
                 </a:lnSpc>
               </a:pPr>
               <a:r>
-                <a:rPr kumimoji="1" lang="en-US" altLang="zh-CN" sz="500" b="1" dirty="0">
+                <a:rPr kumimoji="1" lang="en-US" altLang="zh-CN" sz="500" b="1">
                   <a:solidFill>
                     <a:srgbClr val="FFFFFF"/>
                   </a:solidFill>
@@ -8081,7 +8436,7 @@
                 <a:t>RGB </a:t>
               </a:r>
               <a:br>
-                <a:rPr kumimoji="1" lang="en-US" altLang="zh-CN" sz="500" b="1" dirty="0">
+                <a:rPr kumimoji="1" lang="en-US" altLang="zh-CN" sz="500" b="1">
                   <a:solidFill>
                     <a:srgbClr val="FFFFFF"/>
                   </a:solidFill>
@@ -8091,7 +8446,7 @@
                 </a:rPr>
               </a:br>
               <a:r>
-                <a:rPr kumimoji="1" lang="en-US" altLang="zh-CN" sz="500" b="1" dirty="0">
+                <a:rPr kumimoji="1" lang="en-US" altLang="zh-CN" sz="500" b="1">
                   <a:solidFill>
                     <a:srgbClr val="FFFFFF"/>
                   </a:solidFill>
@@ -8157,7 +8512,7 @@
                 </a:lnSpc>
               </a:pPr>
               <a:r>
-                <a:rPr kumimoji="1" lang="en-US" altLang="zh-CN" sz="500" b="1" dirty="0">
+                <a:rPr kumimoji="1" lang="en-US" altLang="zh-CN" sz="500" b="1">
                   <a:solidFill>
                     <a:srgbClr val="FFFFFF"/>
                   </a:solidFill>
@@ -8168,7 +8523,7 @@
                 <a:t>RGB</a:t>
               </a:r>
               <a:br>
-                <a:rPr kumimoji="1" lang="en-US" altLang="zh-CN" sz="500" b="1" dirty="0">
+                <a:rPr kumimoji="1" lang="en-US" altLang="zh-CN" sz="500" b="1">
                   <a:solidFill>
                     <a:srgbClr val="FFFFFF"/>
                   </a:solidFill>
@@ -8178,7 +8533,7 @@
                 </a:rPr>
               </a:br>
               <a:r>
-                <a:rPr kumimoji="1" lang="en-US" altLang="zh-CN" sz="500" b="1" dirty="0">
+                <a:rPr kumimoji="1" lang="en-US" altLang="zh-CN" sz="500" b="1">
                   <a:solidFill>
                     <a:srgbClr val="FFFFFF"/>
                   </a:solidFill>
@@ -8244,7 +8599,7 @@
                 </a:lnSpc>
               </a:pPr>
               <a:r>
-                <a:rPr kumimoji="1" lang="en-US" altLang="zh-CN" sz="500" b="1" dirty="0">
+                <a:rPr kumimoji="1" lang="en-US" altLang="zh-CN" sz="500" b="1">
                   <a:solidFill>
                     <a:srgbClr val="FFFFFF"/>
                   </a:solidFill>
@@ -8255,7 +8610,7 @@
                 <a:t>RGB</a:t>
               </a:r>
               <a:br>
-                <a:rPr kumimoji="1" lang="en-US" altLang="zh-CN" sz="500" b="1" dirty="0">
+                <a:rPr kumimoji="1" lang="en-US" altLang="zh-CN" sz="500" b="1">
                   <a:solidFill>
                     <a:srgbClr val="FFFFFF"/>
                   </a:solidFill>
@@ -8265,7 +8620,7 @@
                 </a:rPr>
               </a:br>
               <a:r>
-                <a:rPr kumimoji="1" lang="en-US" altLang="zh-CN" sz="500" b="1" dirty="0">
+                <a:rPr kumimoji="1" lang="en-US" altLang="zh-CN" sz="500" b="1">
                   <a:solidFill>
                     <a:srgbClr val="FFFFFF"/>
                   </a:solidFill>
@@ -8331,7 +8686,7 @@
                 </a:lnSpc>
               </a:pPr>
               <a:r>
-                <a:rPr kumimoji="1" lang="en-US" altLang="zh-CN" sz="500" b="1" dirty="0">
+                <a:rPr kumimoji="1" lang="en-US" altLang="zh-CN" sz="500" b="1">
                   <a:solidFill>
                     <a:srgbClr val="FFFFFF"/>
                   </a:solidFill>
@@ -8342,7 +8697,7 @@
                 <a:t>RGB </a:t>
               </a:r>
               <a:br>
-                <a:rPr kumimoji="1" lang="en-US" altLang="zh-CN" sz="500" b="1" dirty="0">
+                <a:rPr kumimoji="1" lang="en-US" altLang="zh-CN" sz="500" b="1">
                   <a:solidFill>
                     <a:srgbClr val="FFFFFF"/>
                   </a:solidFill>
@@ -8352,7 +8707,7 @@
                 </a:rPr>
               </a:br>
               <a:r>
-                <a:rPr kumimoji="1" lang="en-US" altLang="zh-CN" sz="500" b="1" dirty="0">
+                <a:rPr kumimoji="1" lang="en-US" altLang="zh-CN" sz="500" b="1">
                   <a:solidFill>
                     <a:srgbClr val="FFFFFF"/>
                   </a:solidFill>
@@ -8418,7 +8773,7 @@
                 </a:lnSpc>
               </a:pPr>
               <a:r>
-                <a:rPr kumimoji="1" lang="en-US" altLang="zh-CN" sz="500" b="1" dirty="0">
+                <a:rPr kumimoji="1" lang="en-US" altLang="zh-CN" sz="500" b="1">
                   <a:solidFill>
                     <a:srgbClr val="FFFFFF"/>
                   </a:solidFill>
@@ -8429,7 +8784,7 @@
                 <a:t>RGB </a:t>
               </a:r>
               <a:br>
-                <a:rPr kumimoji="1" lang="en-US" altLang="zh-CN" sz="500" b="1" dirty="0">
+                <a:rPr kumimoji="1" lang="en-US" altLang="zh-CN" sz="500" b="1">
                   <a:solidFill>
                     <a:srgbClr val="FFFFFF"/>
                   </a:solidFill>
@@ -8439,7 +8794,7 @@
                 </a:rPr>
               </a:br>
               <a:r>
-                <a:rPr kumimoji="1" lang="en-US" altLang="zh-CN" sz="500" b="1" dirty="0">
+                <a:rPr kumimoji="1" lang="en-US" altLang="zh-CN" sz="500" b="1">
                   <a:solidFill>
                     <a:srgbClr val="FFFFFF"/>
                   </a:solidFill>
@@ -8505,7 +8860,7 @@
                 </a:lnSpc>
               </a:pPr>
               <a:r>
-                <a:rPr kumimoji="1" lang="en-US" altLang="zh-CN" sz="500" b="1" dirty="0">
+                <a:rPr kumimoji="1" lang="en-US" altLang="zh-CN" sz="500" b="1">
                   <a:solidFill>
                     <a:srgbClr val="FFFFFF"/>
                   </a:solidFill>
@@ -8523,7 +8878,7 @@
                 </a:lnSpc>
               </a:pPr>
               <a:r>
-                <a:rPr kumimoji="1" lang="en-US" altLang="zh-CN" sz="500" b="1" dirty="0">
+                <a:rPr kumimoji="1" lang="en-US" altLang="zh-CN" sz="500" b="1">
                   <a:solidFill>
                     <a:srgbClr val="FFFFFF"/>
                   </a:solidFill>
@@ -8589,7 +8944,7 @@
                 </a:lnSpc>
               </a:pPr>
               <a:r>
-                <a:rPr kumimoji="1" lang="en-US" altLang="zh-CN" sz="500" b="1" dirty="0">
+                <a:rPr kumimoji="1" lang="en-US" altLang="zh-CN" sz="500" b="1">
                   <a:solidFill>
                     <a:srgbClr val="595757"/>
                   </a:solidFill>
@@ -8656,7 +9011,7 @@
                 <a:defRPr/>
               </a:pPr>
               <a:r>
-                <a:rPr kumimoji="1" lang="en-US" altLang="zh-CN" sz="500" b="1" dirty="0">
+                <a:rPr kumimoji="1" lang="en-US" altLang="zh-CN" sz="500" b="1">
                   <a:solidFill>
                     <a:srgbClr val="595757"/>
                   </a:solidFill>
@@ -8722,7 +9077,7 @@
                 </a:lnSpc>
               </a:pPr>
               <a:r>
-                <a:rPr kumimoji="1" lang="en-US" altLang="zh-CN" sz="500" b="1" dirty="0">
+                <a:rPr kumimoji="1" lang="en-US" altLang="zh-CN" sz="500" b="1">
                   <a:solidFill>
                     <a:srgbClr val="595757"/>
                   </a:solidFill>
@@ -8732,7 +9087,7 @@
                 </a:rPr>
                 <a:t>RGB 246/183/140</a:t>
               </a:r>
-              <a:endParaRPr kumimoji="1" lang="mr-IN" altLang="zh-CN" sz="500" b="1" dirty="0">
+              <a:endParaRPr kumimoji="1" lang="mr-IN" altLang="zh-CN" sz="500" b="1">
                 <a:solidFill>
                   <a:srgbClr val="595757"/>
                 </a:solidFill>
@@ -8796,7 +9151,7 @@
                 </a:lnSpc>
               </a:pPr>
               <a:r>
-                <a:rPr kumimoji="1" lang="en-US" altLang="zh-CN" sz="500" b="1" dirty="0">
+                <a:rPr kumimoji="1" lang="en-US" altLang="zh-CN" sz="500" b="1">
                   <a:solidFill>
                     <a:srgbClr val="595757"/>
                   </a:solidFill>
@@ -8862,7 +9217,7 @@
                 </a:lnSpc>
               </a:pPr>
               <a:r>
-                <a:rPr kumimoji="1" lang="en-US" altLang="zh-CN" sz="500" b="1" dirty="0">
+                <a:rPr kumimoji="1" lang="en-US" altLang="zh-CN" sz="500" b="1">
                   <a:solidFill>
                     <a:srgbClr val="595757"/>
                   </a:solidFill>
@@ -8928,7 +9283,7 @@
                 </a:lnSpc>
               </a:pPr>
               <a:r>
-                <a:rPr kumimoji="1" lang="en-US" altLang="zh-CN" sz="500" b="1" dirty="0">
+                <a:rPr kumimoji="1" lang="en-US" altLang="zh-CN" sz="500" b="1">
                   <a:solidFill>
                     <a:srgbClr val="595757"/>
                   </a:solidFill>
@@ -8994,7 +9349,7 @@
                 </a:lnSpc>
               </a:pPr>
               <a:r>
-                <a:rPr kumimoji="1" lang="en-US" altLang="zh-CN" sz="500" b="1" dirty="0">
+                <a:rPr kumimoji="1" lang="en-US" altLang="zh-CN" sz="500" b="1">
                   <a:solidFill>
                     <a:srgbClr val="595757"/>
                   </a:solidFill>
@@ -9060,7 +9415,7 @@
                 </a:lnSpc>
               </a:pPr>
               <a:r>
-                <a:rPr kumimoji="1" lang="en-US" altLang="zh-CN" sz="500" b="1" dirty="0">
+                <a:rPr kumimoji="1" lang="en-US" altLang="zh-CN" sz="500" b="1">
                   <a:solidFill>
                     <a:srgbClr val="595757"/>
                   </a:solidFill>
@@ -9126,7 +9481,7 @@
                 </a:lnSpc>
               </a:pPr>
               <a:r>
-                <a:rPr kumimoji="1" lang="en-US" altLang="zh-CN" sz="500" b="1" dirty="0">
+                <a:rPr kumimoji="1" lang="en-US" altLang="zh-CN" sz="500" b="1">
                   <a:solidFill>
                     <a:srgbClr val="595757"/>
                   </a:solidFill>
@@ -9193,7 +9548,7 @@
                 <a:defRPr/>
               </a:pPr>
               <a:r>
-                <a:rPr kumimoji="1" lang="en-US" altLang="zh-CN" sz="500" b="1" dirty="0">
+                <a:rPr kumimoji="1" lang="en-US" altLang="zh-CN" sz="500" b="1">
                   <a:solidFill>
                     <a:srgbClr val="595757"/>
                   </a:solidFill>
@@ -9259,7 +9614,7 @@
                 </a:lnSpc>
               </a:pPr>
               <a:r>
-                <a:rPr kumimoji="1" lang="en-US" altLang="zh-CN" sz="500" b="1" dirty="0">
+                <a:rPr kumimoji="1" lang="en-US" altLang="zh-CN" sz="500" b="1">
                   <a:solidFill>
                     <a:srgbClr val="595757"/>
                   </a:solidFill>
@@ -9269,7 +9624,7 @@
                 </a:rPr>
                 <a:t>RGB 250/211/187</a:t>
               </a:r>
-              <a:endParaRPr kumimoji="1" lang="mr-IN" altLang="zh-CN" sz="500" b="1" dirty="0">
+              <a:endParaRPr kumimoji="1" lang="mr-IN" altLang="zh-CN" sz="500" b="1">
                 <a:solidFill>
                   <a:srgbClr val="595757"/>
                 </a:solidFill>
@@ -9333,7 +9688,7 @@
                 </a:lnSpc>
               </a:pPr>
               <a:r>
-                <a:rPr kumimoji="1" lang="en-US" altLang="zh-CN" sz="500" b="1" dirty="0">
+                <a:rPr kumimoji="1" lang="en-US" altLang="zh-CN" sz="500" b="1">
                   <a:solidFill>
                     <a:srgbClr val="595757"/>
                   </a:solidFill>
@@ -9399,7 +9754,7 @@
                 </a:lnSpc>
               </a:pPr>
               <a:r>
-                <a:rPr kumimoji="1" lang="en-US" altLang="zh-CN" sz="500" b="1" dirty="0">
+                <a:rPr kumimoji="1" lang="en-US" altLang="zh-CN" sz="500" b="1">
                   <a:solidFill>
                     <a:srgbClr val="595757"/>
                   </a:solidFill>
@@ -9465,7 +9820,7 @@
                 </a:lnSpc>
               </a:pPr>
               <a:r>
-                <a:rPr kumimoji="1" lang="en-US" altLang="zh-CN" sz="500" b="1" dirty="0">
+                <a:rPr kumimoji="1" lang="en-US" altLang="zh-CN" sz="500" b="1">
                   <a:solidFill>
                     <a:srgbClr val="595757"/>
                   </a:solidFill>
@@ -9476,7 +9831,7 @@
                 <a:t>RGB</a:t>
               </a:r>
               <a:br>
-                <a:rPr kumimoji="1" lang="en-US" altLang="zh-CN" sz="500" b="1" dirty="0">
+                <a:rPr kumimoji="1" lang="en-US" altLang="zh-CN" sz="500" b="1">
                   <a:solidFill>
                     <a:srgbClr val="595757"/>
                   </a:solidFill>
@@ -9486,7 +9841,7 @@
                 </a:rPr>
               </a:br>
               <a:r>
-                <a:rPr kumimoji="1" lang="en-US" altLang="zh-CN" sz="500" b="1" dirty="0">
+                <a:rPr kumimoji="1" lang="en-US" altLang="zh-CN" sz="500" b="1">
                   <a:solidFill>
                     <a:srgbClr val="595757"/>
                   </a:solidFill>
@@ -9552,7 +9907,7 @@
                 </a:lnSpc>
               </a:pPr>
               <a:r>
-                <a:rPr kumimoji="1" lang="en-US" altLang="zh-CN" sz="500" b="1" dirty="0">
+                <a:rPr kumimoji="1" lang="en-US" altLang="zh-CN" sz="500" b="1">
                   <a:solidFill>
                     <a:srgbClr val="595757"/>
                   </a:solidFill>
@@ -9618,7 +9973,7 @@
                 </a:lnSpc>
               </a:pPr>
               <a:r>
-                <a:rPr kumimoji="1" lang="en-US" altLang="zh-CN" sz="500" b="1" dirty="0">
+                <a:rPr kumimoji="1" lang="en-US" altLang="zh-CN" sz="500" b="1">
                   <a:solidFill>
                     <a:srgbClr val="595757"/>
                   </a:solidFill>
@@ -9684,7 +10039,7 @@
                 </a:lnSpc>
               </a:pPr>
               <a:r>
-                <a:rPr kumimoji="1" lang="en-US" altLang="zh-CN" sz="500" b="1" dirty="0">
+                <a:rPr kumimoji="1" lang="en-US" altLang="zh-CN" sz="500" b="1">
                   <a:solidFill>
                     <a:srgbClr val="FFFFFF"/>
                   </a:solidFill>
@@ -9695,7 +10050,7 @@
                 <a:t>RGB </a:t>
               </a:r>
               <a:br>
-                <a:rPr kumimoji="1" lang="en-US" altLang="zh-CN" sz="500" b="1" dirty="0">
+                <a:rPr kumimoji="1" lang="en-US" altLang="zh-CN" sz="500" b="1">
                   <a:solidFill>
                     <a:srgbClr val="FFFFFF"/>
                   </a:solidFill>
@@ -9705,7 +10060,7 @@
                 </a:rPr>
               </a:br>
               <a:r>
-                <a:rPr kumimoji="1" lang="en-US" altLang="zh-CN" sz="500" b="1" dirty="0">
+                <a:rPr kumimoji="1" lang="en-US" altLang="zh-CN" sz="500" b="1">
                   <a:solidFill>
                     <a:srgbClr val="FFFFFF"/>
                   </a:solidFill>
@@ -9771,7 +10126,7 @@
                 </a:lnSpc>
               </a:pPr>
               <a:r>
-                <a:rPr kumimoji="1" lang="en-US" altLang="zh-CN" sz="500" b="1" dirty="0">
+                <a:rPr kumimoji="1" lang="en-US" altLang="zh-CN" sz="500" b="1">
                   <a:solidFill>
                     <a:srgbClr val="FFFFFF"/>
                   </a:solidFill>
@@ -9789,7 +10144,7 @@
                 </a:lnSpc>
               </a:pPr>
               <a:r>
-                <a:rPr kumimoji="1" lang="en-US" altLang="zh-CN" sz="500" b="1" dirty="0">
+                <a:rPr kumimoji="1" lang="en-US" altLang="zh-CN" sz="500" b="1">
                   <a:solidFill>
                     <a:srgbClr val="FFFFFF"/>
                   </a:solidFill>
@@ -9855,7 +10210,7 @@
                 </a:lnSpc>
               </a:pPr>
               <a:r>
-                <a:rPr kumimoji="1" lang="en-US" altLang="zh-CN" sz="500" b="1" dirty="0">
+                <a:rPr kumimoji="1" lang="en-US" altLang="zh-CN" sz="500" b="1">
                   <a:solidFill>
                     <a:srgbClr val="FFFFFF"/>
                   </a:solidFill>
@@ -9873,7 +10228,7 @@
                 </a:lnSpc>
               </a:pPr>
               <a:r>
-                <a:rPr kumimoji="1" lang="en-US" altLang="zh-CN" sz="500" b="1" dirty="0">
+                <a:rPr kumimoji="1" lang="en-US" altLang="zh-CN" sz="500" b="1">
                   <a:solidFill>
                     <a:srgbClr val="FFFFFF"/>
                   </a:solidFill>
@@ -9884,7 +10239,7 @@
                 <a:t>137/137/</a:t>
               </a:r>
               <a:br>
-                <a:rPr kumimoji="1" lang="en-US" altLang="zh-CN" sz="500" b="1" dirty="0">
+                <a:rPr kumimoji="1" lang="en-US" altLang="zh-CN" sz="500" b="1">
                   <a:solidFill>
                     <a:srgbClr val="FFFFFF"/>
                   </a:solidFill>
@@ -9894,7 +10249,7 @@
                 </a:rPr>
               </a:br>
               <a:r>
-                <a:rPr kumimoji="1" lang="en-US" altLang="zh-CN" sz="500" b="1" dirty="0">
+                <a:rPr kumimoji="1" lang="en-US" altLang="zh-CN" sz="500" b="1">
                   <a:solidFill>
                     <a:srgbClr val="FFFFFF"/>
                   </a:solidFill>
@@ -9960,7 +10315,7 @@
                 </a:lnSpc>
               </a:pPr>
               <a:r>
-                <a:rPr kumimoji="1" lang="en-US" altLang="zh-CN" sz="500" b="1" dirty="0">
+                <a:rPr kumimoji="1" lang="en-US" altLang="zh-CN" sz="500" b="1">
                   <a:solidFill>
                     <a:srgbClr val="FFFFFF"/>
                   </a:solidFill>
@@ -9978,7 +10333,7 @@
                 </a:lnSpc>
               </a:pPr>
               <a:r>
-                <a:rPr kumimoji="1" lang="en-US" altLang="zh-CN" sz="500" b="1" dirty="0">
+                <a:rPr kumimoji="1" lang="en-US" altLang="zh-CN" sz="500" b="1">
                   <a:solidFill>
                     <a:srgbClr val="FFFFFF"/>
                   </a:solidFill>
@@ -9989,7 +10344,7 @@
                 <a:t>181/181/</a:t>
               </a:r>
               <a:br>
-                <a:rPr kumimoji="1" lang="en-US" altLang="zh-CN" sz="500" b="1" dirty="0">
+                <a:rPr kumimoji="1" lang="en-US" altLang="zh-CN" sz="500" b="1">
                   <a:solidFill>
                     <a:srgbClr val="FFFFFF"/>
                   </a:solidFill>
@@ -9999,7 +10354,7 @@
                 </a:rPr>
               </a:br>
               <a:r>
-                <a:rPr kumimoji="1" lang="en-US" altLang="zh-CN" sz="500" b="1" dirty="0">
+                <a:rPr kumimoji="1" lang="en-US" altLang="zh-CN" sz="500" b="1">
                   <a:solidFill>
                     <a:srgbClr val="FFFFFF"/>
                   </a:solidFill>
@@ -10065,7 +10420,7 @@
                 </a:lnSpc>
               </a:pPr>
               <a:r>
-                <a:rPr kumimoji="1" lang="en-US" altLang="zh-CN" sz="500" b="1" dirty="0">
+                <a:rPr kumimoji="1" lang="en-US" altLang="zh-CN" sz="500" b="1">
                   <a:solidFill>
                     <a:srgbClr val="595757"/>
                   </a:solidFill>
@@ -10076,7 +10431,7 @@
                 <a:t>RGB 221/221/</a:t>
               </a:r>
               <a:br>
-                <a:rPr kumimoji="1" lang="en-US" altLang="zh-CN" sz="500" b="1" dirty="0">
+                <a:rPr kumimoji="1" lang="en-US" altLang="zh-CN" sz="500" b="1">
                   <a:solidFill>
                     <a:srgbClr val="595757"/>
                   </a:solidFill>
@@ -10086,7 +10441,7 @@
                 </a:rPr>
               </a:br>
               <a:r>
-                <a:rPr kumimoji="1" lang="en-US" altLang="zh-CN" sz="500" b="1" dirty="0">
+                <a:rPr kumimoji="1" lang="en-US" altLang="zh-CN" sz="500" b="1">
                   <a:solidFill>
                     <a:srgbClr val="595757"/>
                   </a:solidFill>
@@ -10154,7 +10509,7 @@
                 </a:lnSpc>
               </a:pPr>
               <a:r>
-                <a:rPr kumimoji="1" lang="en-US" altLang="zh-CN" sz="500" b="1" dirty="0">
+                <a:rPr kumimoji="1" lang="en-US" altLang="zh-CN" sz="500" b="1">
                   <a:solidFill>
                     <a:srgbClr val="595757"/>
                   </a:solidFill>
@@ -10172,7 +10527,7 @@
                 </a:lnSpc>
               </a:pPr>
               <a:r>
-                <a:rPr kumimoji="1" lang="en-US" altLang="zh-CN" sz="500" b="1" dirty="0">
+                <a:rPr kumimoji="1" lang="en-US" altLang="zh-CN" sz="500" b="1">
                   <a:solidFill>
                     <a:srgbClr val="595757"/>
                   </a:solidFill>
@@ -10183,7 +10538,7 @@
                 <a:t>255/255/</a:t>
               </a:r>
               <a:br>
-                <a:rPr kumimoji="1" lang="en-US" altLang="zh-CN" sz="500" b="1" dirty="0">
+                <a:rPr kumimoji="1" lang="en-US" altLang="zh-CN" sz="500" b="1">
                   <a:solidFill>
                     <a:srgbClr val="595757"/>
                   </a:solidFill>
@@ -10193,7 +10548,7 @@
                 </a:rPr>
               </a:br>
               <a:r>
-                <a:rPr kumimoji="1" lang="en-US" altLang="zh-CN" sz="500" b="1" dirty="0">
+                <a:rPr kumimoji="1" lang="en-US" altLang="zh-CN" sz="500" b="1">
                   <a:solidFill>
                     <a:srgbClr val="595757"/>
                   </a:solidFill>
@@ -10585,7 +10940,7 @@
               <a:buNone/>
             </a:pPr>
             <a:r>
-              <a:rPr lang="en-US" dirty="0"/>
+              <a:rPr lang="en-US"/>
               <a:t>Customer Premise Equipment Management API Proposal</a:t>
             </a:r>
           </a:p>
@@ -10634,10 +10989,10 @@
           <a:lstStyle/>
           <a:p>
             <a:r>
-              <a:rPr lang="en-US" dirty="0"/>
+              <a:rPr lang="en-US"/>
               <a:t>High-Level Overview</a:t>
             </a:r>
-            <a:endParaRPr lang="zh-CN" altLang="en-US" dirty="0"/>
+            <a:endParaRPr lang="zh-CN" altLang="en-US"/>
           </a:p>
         </p:txBody>
       </p:sp>
@@ -10707,11 +11062,11 @@
           <a:p>
             <a:pPr indent="-457200"/>
             <a:r>
-              <a:rPr lang="en-US" dirty="0"/>
+              <a:rPr lang="en-US"/>
               <a:t>Customer Premises Equipment (CPE), </a:t>
             </a:r>
             <a:r>
-              <a:rPr lang="en-US" b="0" i="0" dirty="0">
+              <a:rPr lang="en-US" b="0" i="0">
                 <a:solidFill>
                   <a:srgbClr val="374151"/>
                 </a:solidFill>
@@ -10723,7 +11078,7 @@
               <a:t>refers to telecommunications and information technology equipment located at the customer's site, specifically associated with their account and address</a:t>
             </a:r>
             <a:r>
-              <a:rPr lang="en-US" dirty="0">
+              <a:rPr lang="en-US">
                 <a:solidFill>
                   <a:srgbClr val="374151"/>
                 </a:solidFill>
@@ -10733,7 +11088,7 @@
               </a:rPr>
               <a:t>:</a:t>
             </a:r>
-            <a:endParaRPr lang="en-US" b="0" i="0" dirty="0">
+            <a:endParaRPr lang="en-US" b="0" i="0">
               <a:solidFill>
                 <a:srgbClr val="374151"/>
               </a:solidFill>
@@ -10745,7 +11100,7 @@
           </a:p>
           <a:p>
             <a:pPr indent="-457200"/>
-            <a:endParaRPr lang="en-US" dirty="0">
+            <a:endParaRPr lang="en-US">
               <a:solidFill>
                 <a:srgbClr val="374151"/>
               </a:solidFill>
@@ -10758,7 +11113,7 @@
               <a:buChar char="•"/>
             </a:pPr>
             <a:r>
-              <a:rPr lang="en-US" dirty="0">
+              <a:rPr lang="en-US">
                 <a:solidFill>
                   <a:srgbClr val="374151"/>
                 </a:solidFill>
@@ -10775,7 +11130,7 @@
               <a:buChar char="•"/>
             </a:pPr>
             <a:r>
-              <a:rPr lang="en-US" dirty="0">
+              <a:rPr lang="en-US">
                 <a:solidFill>
                   <a:srgbClr val="374151"/>
                 </a:solidFill>
@@ -10792,7 +11147,7 @@
               <a:buChar char="•"/>
             </a:pPr>
             <a:r>
-              <a:rPr lang="en-US" dirty="0">
+              <a:rPr lang="en-US">
                 <a:solidFill>
                   <a:srgbClr val="374151"/>
                 </a:solidFill>
@@ -10834,7 +11189,7 @@
           <a:lstStyle/>
           <a:p>
             <a:r>
-              <a:rPr lang="en-US" b="0" i="0" dirty="0">
+              <a:rPr lang="en-US" b="0" i="0">
                 <a:solidFill>
                   <a:srgbClr val="374151"/>
                 </a:solidFill>
@@ -10843,7 +11198,7 @@
               <a:t>The CPE Management APIs enhance functionality for value </a:t>
             </a:r>
             <a:r>
-              <a:rPr lang="en-US" dirty="0">
+              <a:rPr lang="en-US">
                 <a:solidFill>
                   <a:srgbClr val="374151"/>
                 </a:solidFill>
@@ -10851,7 +11206,7 @@
               <a:t>a</a:t>
             </a:r>
             <a:r>
-              <a:rPr lang="en-US" b="0" i="0" dirty="0">
+              <a:rPr lang="en-US" b="0" i="0">
                 <a:solidFill>
                   <a:srgbClr val="374151"/>
                 </a:solidFill>
@@ -10860,7 +11215,7 @@
               <a:t>dded </a:t>
             </a:r>
             <a:r>
-              <a:rPr lang="en-US" dirty="0">
+              <a:rPr lang="en-US">
                 <a:solidFill>
                   <a:srgbClr val="374151"/>
                 </a:solidFill>
@@ -10868,7 +11223,7 @@
               <a:t>r</a:t>
             </a:r>
             <a:r>
-              <a:rPr lang="en-US" b="0" i="0" dirty="0">
+              <a:rPr lang="en-US" b="0" i="0">
                 <a:solidFill>
                   <a:srgbClr val="374151"/>
                 </a:solidFill>
@@ -10877,7 +11232,7 @@
               <a:t>esellers and vendors in the short-term </a:t>
             </a:r>
             <a:r>
-              <a:rPr lang="en-US" dirty="0">
+              <a:rPr lang="en-US">
                 <a:solidFill>
                   <a:srgbClr val="374151"/>
                 </a:solidFill>
@@ -10885,7 +11240,7 @@
               <a:t>r</a:t>
             </a:r>
             <a:r>
-              <a:rPr lang="en-US" b="0" i="0" dirty="0">
+              <a:rPr lang="en-US" b="0" i="0">
                 <a:solidFill>
                   <a:srgbClr val="374151"/>
                 </a:solidFill>
@@ -10895,7 +11250,7 @@
             </a:r>
           </a:p>
           <a:p>
-            <a:endParaRPr lang="en-US" dirty="0">
+            <a:endParaRPr lang="en-US">
               <a:solidFill>
                 <a:srgbClr val="374151"/>
               </a:solidFill>
@@ -10907,7 +11262,7 @@
               <a:buChar char="•"/>
             </a:pPr>
             <a:r>
-              <a:rPr lang="en-US" dirty="0">
+              <a:rPr lang="en-US">
                 <a:solidFill>
                   <a:srgbClr val="374151"/>
                 </a:solidFill>
@@ -10921,14 +11276,14 @@
               <a:buChar char="•"/>
             </a:pPr>
             <a:r>
-              <a:rPr lang="en-US" dirty="0">
+              <a:rPr lang="en-US">
                 <a:solidFill>
                   <a:srgbClr val="374151"/>
                 </a:solidFill>
               </a:rPr>
               <a:t>Reboot equipment</a:t>
             </a:r>
-            <a:endParaRPr lang="en-US" dirty="0"/>
+            <a:endParaRPr lang="en-US"/>
           </a:p>
         </p:txBody>
       </p:sp>
@@ -11021,10 +11376,10 @@
           <a:lstStyle/>
           <a:p>
             <a:r>
-              <a:rPr lang="en-US" altLang="zh-CN" dirty="0"/>
+              <a:rPr lang="en-US" altLang="zh-CN"/>
               <a:t>Example Flow</a:t>
             </a:r>
-            <a:endParaRPr lang="zh-CN" altLang="en-US" dirty="0"/>
+            <a:endParaRPr lang="zh-CN" altLang="en-US"/>
           </a:p>
         </p:txBody>
       </p:sp>
@@ -11227,7 +11582,7 @@
               <a:buNone/>
             </a:pPr>
             <a:r>
-              <a:rPr lang="en-US" sz="2400" b="1" dirty="0"/>
+              <a:rPr lang="en-US" sz="2400" b="1"/>
               <a:t>Service Site</a:t>
             </a:r>
           </a:p>
@@ -11236,13 +11591,13 @@
               <a:buNone/>
             </a:pPr>
             <a:r>
-              <a:rPr lang="en-US" sz="1800" dirty="0"/>
+              <a:rPr lang="en-US" sz="1800"/>
               <a:t>A distinct service owner location, as interpreted by the network operator, with one or more devices. A service site typically has a one-to-one relationship with the mailing address of the location.</a:t>
             </a:r>
             <a:br>
-              <a:rPr lang="en-US" sz="1800" dirty="0"/>
+              <a:rPr lang="en-US" sz="1800"/>
             </a:br>
-            <a:endParaRPr lang="en-US" sz="1800" dirty="0">
+            <a:endParaRPr lang="en-US" sz="1800">
               <a:ea typeface="Calibri"/>
               <a:cs typeface="Calibri"/>
             </a:endParaRPr>
@@ -11252,10 +11607,10 @@
               <a:buNone/>
             </a:pPr>
             <a:r>
-              <a:rPr lang="en-US" sz="2400" b="1" dirty="0"/>
+              <a:rPr lang="en-US" sz="2400" b="1"/>
               <a:t>Device</a:t>
             </a:r>
-            <a:endParaRPr lang="en-US" sz="1800" b="1" dirty="0">
+            <a:endParaRPr lang="en-US" sz="1800" b="1">
               <a:cs typeface="Calibri"/>
             </a:endParaRPr>
           </a:p>
@@ -11264,7 +11619,7 @@
               <a:buNone/>
             </a:pPr>
             <a:r>
-              <a:rPr lang="en-US" sz="1800" dirty="0"/>
+              <a:rPr lang="en-US" sz="1800"/>
               <a:t>A network operator supplied network access device that supports isolated networks.</a:t>
             </a:r>
           </a:p>
@@ -11334,7 +11689,7 @@
           <a:p>
             <a:pPr algn="ctr"/>
             <a:r>
-              <a:rPr lang="en-US" sz="1300" b="1" cap="all" dirty="0">
+              <a:rPr lang="en-US" sz="1300" b="1" cap="all">
                 <a:ea typeface="+mn-lt"/>
                 <a:cs typeface="+mn-lt"/>
               </a:rPr>
@@ -11347,6 +11702,1363 @@
     <p:extLst>
       <p:ext uri="{BB962C8B-B14F-4D97-AF65-F5344CB8AC3E}">
         <p14:creationId xmlns:p14="http://schemas.microsoft.com/office/powerpoint/2010/main" val="1838484401"/>
+      </p:ext>
+    </p:extLst>
+  </p:cSld>
+  <p:clrMapOvr>
+    <a:masterClrMapping/>
+  </p:clrMapOvr>
+</p:sld>
+</file>
+
+<file path=ppt/slides/slide4.xml><?xml version="1.0" encoding="utf-8"?>
+<p:sld xmlns:a="http://schemas.openxmlformats.org/drawingml/2006/main" xmlns:r="http://schemas.openxmlformats.org/officeDocument/2006/relationships" xmlns:p="http://schemas.openxmlformats.org/presentationml/2006/main">
+  <p:cSld>
+    <p:spTree>
+      <p:nvGrpSpPr>
+        <p:cNvPr id="1" name=""/>
+        <p:cNvGrpSpPr/>
+        <p:nvPr/>
+      </p:nvGrpSpPr>
+      <p:grpSpPr>
+        <a:xfrm>
+          <a:off x="0" y="0"/>
+          <a:ext cx="0" cy="0"/>
+          <a:chOff x="0" y="0"/>
+          <a:chExt cx="0" cy="0"/>
+        </a:xfrm>
+      </p:grpSpPr>
+      <p:sp>
+        <p:nvSpPr>
+          <p:cNvPr id="2" name="标题 1"/>
+          <p:cNvSpPr>
+            <a:spLocks noGrp="1"/>
+          </p:cNvSpPr>
+          <p:nvPr>
+            <p:ph type="title"/>
+          </p:nvPr>
+        </p:nvSpPr>
+        <p:spPr>
+          <a:xfrm>
+            <a:off x="391629" y="429776"/>
+            <a:ext cx="6701898" cy="829647"/>
+          </a:xfrm>
+        </p:spPr>
+        <p:txBody>
+          <a:bodyPr>
+            <a:normAutofit fontScale="90000"/>
+          </a:bodyPr>
+          <a:lstStyle/>
+          <a:p>
+            <a:r>
+              <a:rPr lang="en-US" altLang="zh-CN" dirty="0">
+                <a:latin typeface="Montserrat Light"/>
+                <a:ea typeface="宋体"/>
+              </a:rPr>
+              <a:t>Use Case (B2B2C) – Short Term Rental</a:t>
+            </a:r>
+            <a:endParaRPr lang="zh-CN" altLang="en-US" dirty="0"/>
+          </a:p>
+        </p:txBody>
+      </p:sp>
+      <p:sp>
+        <p:nvSpPr>
+          <p:cNvPr id="9" name="Content Placeholder 2">
+            <a:extLst>
+              <a:ext uri="{FF2B5EF4-FFF2-40B4-BE49-F238E27FC236}">
+                <a16:creationId xmlns:a16="http://schemas.microsoft.com/office/drawing/2014/main" id="{017B6D27-981E-5F37-C94A-C89F8748C828}"/>
+              </a:ext>
+            </a:extLst>
+          </p:cNvPr>
+          <p:cNvSpPr txBox="1">
+            <a:spLocks/>
+          </p:cNvSpPr>
+          <p:nvPr/>
+        </p:nvSpPr>
+        <p:spPr>
+          <a:xfrm>
+            <a:off x="282546" y="2111332"/>
+            <a:ext cx="5338862" cy="994158"/>
+          </a:xfrm>
+          <a:prstGeom prst="rect">
+            <a:avLst/>
+          </a:prstGeom>
+          <a:solidFill>
+            <a:srgbClr val="B3DFF3"/>
+          </a:solidFill>
+        </p:spPr>
+        <p:txBody>
+          <a:bodyPr vert="horz" lIns="91440" tIns="45720" rIns="91440" bIns="45720" rtlCol="0" anchor="ctr">
+            <a:normAutofit/>
+          </a:bodyPr>
+          <a:lstStyle>
+            <a:lvl1pPr marL="228600" indent="-228600" algn="l" defTabSz="914400" rtl="0" eaLnBrk="1" latinLnBrk="0" hangingPunct="1">
+              <a:lnSpc>
+                <a:spcPct val="90000"/>
+              </a:lnSpc>
+              <a:spcBef>
+                <a:spcPts val="1000"/>
+              </a:spcBef>
+              <a:buFont typeface="Arial" panose="020B0604020202020204" pitchFamily="34" charset="0"/>
+              <a:buChar char="•"/>
+              <a:defRPr sz="2800" kern="1200">
+                <a:solidFill>
+                  <a:schemeClr val="tx1"/>
+                </a:solidFill>
+                <a:latin typeface="+mn-lt"/>
+                <a:ea typeface="+mn-ea"/>
+                <a:cs typeface="+mn-cs"/>
+              </a:defRPr>
+            </a:lvl1pPr>
+            <a:lvl2pPr marL="685800" indent="-228600" algn="l" defTabSz="914400" rtl="0" eaLnBrk="1" latinLnBrk="0" hangingPunct="1">
+              <a:lnSpc>
+                <a:spcPct val="90000"/>
+              </a:lnSpc>
+              <a:spcBef>
+                <a:spcPts val="500"/>
+              </a:spcBef>
+              <a:buFont typeface="Arial" panose="020B0604020202020204" pitchFamily="34" charset="0"/>
+              <a:buChar char="•"/>
+              <a:defRPr sz="2400" kern="1200">
+                <a:solidFill>
+                  <a:schemeClr val="tx1"/>
+                </a:solidFill>
+                <a:latin typeface="+mn-lt"/>
+                <a:ea typeface="+mn-ea"/>
+                <a:cs typeface="+mn-cs"/>
+              </a:defRPr>
+            </a:lvl2pPr>
+            <a:lvl3pPr marL="1143000" indent="-228600" algn="l" defTabSz="914400" rtl="0" eaLnBrk="1" latinLnBrk="0" hangingPunct="1">
+              <a:lnSpc>
+                <a:spcPct val="90000"/>
+              </a:lnSpc>
+              <a:spcBef>
+                <a:spcPts val="500"/>
+              </a:spcBef>
+              <a:buFont typeface="Arial" panose="020B0604020202020204" pitchFamily="34" charset="0"/>
+              <a:buChar char="•"/>
+              <a:defRPr sz="2000" kern="1200">
+                <a:solidFill>
+                  <a:schemeClr val="tx1"/>
+                </a:solidFill>
+                <a:latin typeface="+mn-lt"/>
+                <a:ea typeface="+mn-ea"/>
+                <a:cs typeface="+mn-cs"/>
+              </a:defRPr>
+            </a:lvl3pPr>
+            <a:lvl4pPr marL="1600200" indent="-228600" algn="l" defTabSz="914400" rtl="0" eaLnBrk="1" latinLnBrk="0" hangingPunct="1">
+              <a:lnSpc>
+                <a:spcPct val="90000"/>
+              </a:lnSpc>
+              <a:spcBef>
+                <a:spcPts val="500"/>
+              </a:spcBef>
+              <a:buFont typeface="Arial" panose="020B0604020202020204" pitchFamily="34" charset="0"/>
+              <a:buChar char="•"/>
+              <a:defRPr sz="1800" kern="1200">
+                <a:solidFill>
+                  <a:schemeClr val="tx1"/>
+                </a:solidFill>
+                <a:latin typeface="+mn-lt"/>
+                <a:ea typeface="+mn-ea"/>
+                <a:cs typeface="+mn-cs"/>
+              </a:defRPr>
+            </a:lvl4pPr>
+            <a:lvl5pPr marL="2057400" indent="-228600" algn="l" defTabSz="914400" rtl="0" eaLnBrk="1" latinLnBrk="0" hangingPunct="1">
+              <a:lnSpc>
+                <a:spcPct val="90000"/>
+              </a:lnSpc>
+              <a:spcBef>
+                <a:spcPts val="500"/>
+              </a:spcBef>
+              <a:buFont typeface="Arial" panose="020B0604020202020204" pitchFamily="34" charset="0"/>
+              <a:buChar char="•"/>
+              <a:defRPr sz="1800" kern="1200">
+                <a:solidFill>
+                  <a:schemeClr val="tx1"/>
+                </a:solidFill>
+                <a:latin typeface="+mn-lt"/>
+                <a:ea typeface="+mn-ea"/>
+                <a:cs typeface="+mn-cs"/>
+              </a:defRPr>
+            </a:lvl5pPr>
+            <a:lvl6pPr marL="2514600" indent="-228600" algn="l" defTabSz="914400" rtl="0" eaLnBrk="1" latinLnBrk="0" hangingPunct="1">
+              <a:lnSpc>
+                <a:spcPct val="90000"/>
+              </a:lnSpc>
+              <a:spcBef>
+                <a:spcPts val="500"/>
+              </a:spcBef>
+              <a:buFont typeface="Arial" panose="020B0604020202020204" pitchFamily="34" charset="0"/>
+              <a:buChar char="•"/>
+              <a:defRPr sz="1800" kern="1200">
+                <a:solidFill>
+                  <a:schemeClr val="tx1"/>
+                </a:solidFill>
+                <a:latin typeface="+mn-lt"/>
+                <a:ea typeface="+mn-ea"/>
+                <a:cs typeface="+mn-cs"/>
+              </a:defRPr>
+            </a:lvl6pPr>
+            <a:lvl7pPr marL="2971800" indent="-228600" algn="l" defTabSz="914400" rtl="0" eaLnBrk="1" latinLnBrk="0" hangingPunct="1">
+              <a:lnSpc>
+                <a:spcPct val="90000"/>
+              </a:lnSpc>
+              <a:spcBef>
+                <a:spcPts val="500"/>
+              </a:spcBef>
+              <a:buFont typeface="Arial" panose="020B0604020202020204" pitchFamily="34" charset="0"/>
+              <a:buChar char="•"/>
+              <a:defRPr sz="1800" kern="1200">
+                <a:solidFill>
+                  <a:schemeClr val="tx1"/>
+                </a:solidFill>
+                <a:latin typeface="+mn-lt"/>
+                <a:ea typeface="+mn-ea"/>
+                <a:cs typeface="+mn-cs"/>
+              </a:defRPr>
+            </a:lvl7pPr>
+            <a:lvl8pPr marL="3429000" indent="-228600" algn="l" defTabSz="914400" rtl="0" eaLnBrk="1" latinLnBrk="0" hangingPunct="1">
+              <a:lnSpc>
+                <a:spcPct val="90000"/>
+              </a:lnSpc>
+              <a:spcBef>
+                <a:spcPts val="500"/>
+              </a:spcBef>
+              <a:buFont typeface="Arial" panose="020B0604020202020204" pitchFamily="34" charset="0"/>
+              <a:buChar char="•"/>
+              <a:defRPr sz="1800" kern="1200">
+                <a:solidFill>
+                  <a:schemeClr val="tx1"/>
+                </a:solidFill>
+                <a:latin typeface="+mn-lt"/>
+                <a:ea typeface="+mn-ea"/>
+                <a:cs typeface="+mn-cs"/>
+              </a:defRPr>
+            </a:lvl8pPr>
+            <a:lvl9pPr marL="3886200" indent="-228600" algn="l" defTabSz="914400" rtl="0" eaLnBrk="1" latinLnBrk="0" hangingPunct="1">
+              <a:lnSpc>
+                <a:spcPct val="90000"/>
+              </a:lnSpc>
+              <a:spcBef>
+                <a:spcPts val="500"/>
+              </a:spcBef>
+              <a:buFont typeface="Arial" panose="020B0604020202020204" pitchFamily="34" charset="0"/>
+              <a:buChar char="•"/>
+              <a:defRPr sz="1800" kern="1200">
+                <a:solidFill>
+                  <a:schemeClr val="tx1"/>
+                </a:solidFill>
+                <a:latin typeface="+mn-lt"/>
+                <a:ea typeface="+mn-ea"/>
+                <a:cs typeface="+mn-cs"/>
+              </a:defRPr>
+            </a:lvl9pPr>
+          </a:lstStyle>
+          <a:p>
+            <a:pPr marL="0" indent="0" algn="ctr">
+              <a:buNone/>
+            </a:pPr>
+            <a:r>
+              <a:rPr lang="en-US" sz="1800"/>
+              <a:t>Example short term rental use case for managing a guest network for a host that is the subscriber with a single device.</a:t>
+            </a:r>
+            <a:endParaRPr lang="en-US" sz="1800">
+              <a:ea typeface="Calibri"/>
+              <a:cs typeface="Calibri"/>
+            </a:endParaRPr>
+          </a:p>
+        </p:txBody>
+      </p:sp>
+      <p:pic>
+        <p:nvPicPr>
+          <p:cNvPr id="3" name="Picture 2" descr="A diagram of a customer service&#10;&#10;Description automatically generated">
+            <a:extLst>
+              <a:ext uri="{FF2B5EF4-FFF2-40B4-BE49-F238E27FC236}">
+                <a16:creationId xmlns:a16="http://schemas.microsoft.com/office/drawing/2014/main" id="{6ADC52D9-1F82-DF95-35FF-9F749DDD0966}"/>
+              </a:ext>
+            </a:extLst>
+          </p:cNvPr>
+          <p:cNvPicPr>
+            <a:picLocks noChangeAspect="1"/>
+          </p:cNvPicPr>
+          <p:nvPr/>
+        </p:nvPicPr>
+        <p:blipFill>
+          <a:blip r:embed="rId3"/>
+          <a:stretch>
+            <a:fillRect/>
+          </a:stretch>
+        </p:blipFill>
+        <p:spPr>
+          <a:xfrm>
+            <a:off x="6093107" y="1813544"/>
+            <a:ext cx="5601689" cy="1819274"/>
+          </a:xfrm>
+          <a:prstGeom prst="rect">
+            <a:avLst/>
+          </a:prstGeom>
+        </p:spPr>
+      </p:pic>
+      <p:pic>
+        <p:nvPicPr>
+          <p:cNvPr id="6" name="Picture 5" descr="A screenshot of a computer&#10;&#10;Description automatically generated">
+            <a:extLst>
+              <a:ext uri="{FF2B5EF4-FFF2-40B4-BE49-F238E27FC236}">
+                <a16:creationId xmlns:a16="http://schemas.microsoft.com/office/drawing/2014/main" id="{2B443378-8BB2-916E-1D10-C5317C16B496}"/>
+              </a:ext>
+            </a:extLst>
+          </p:cNvPr>
+          <p:cNvPicPr>
+            <a:picLocks noChangeAspect="1"/>
+          </p:cNvPicPr>
+          <p:nvPr/>
+        </p:nvPicPr>
+        <p:blipFill>
+          <a:blip r:embed="rId4"/>
+          <a:stretch>
+            <a:fillRect/>
+          </a:stretch>
+        </p:blipFill>
+        <p:spPr>
+          <a:xfrm>
+            <a:off x="133684" y="3748652"/>
+            <a:ext cx="10301843" cy="2931224"/>
+          </a:xfrm>
+          <a:prstGeom prst="rect">
+            <a:avLst/>
+          </a:prstGeom>
+        </p:spPr>
+      </p:pic>
+    </p:spTree>
+    <p:extLst>
+      <p:ext uri="{BB962C8B-B14F-4D97-AF65-F5344CB8AC3E}">
+        <p14:creationId xmlns:p14="http://schemas.microsoft.com/office/powerpoint/2010/main" val="1518907061"/>
+      </p:ext>
+    </p:extLst>
+  </p:cSld>
+  <p:clrMapOvr>
+    <a:masterClrMapping/>
+  </p:clrMapOvr>
+</p:sld>
+</file>
+
+<file path=ppt/slides/slide5.xml><?xml version="1.0" encoding="utf-8"?>
+<p:sld xmlns:a="http://schemas.openxmlformats.org/drawingml/2006/main" xmlns:r="http://schemas.openxmlformats.org/officeDocument/2006/relationships" xmlns:p="http://schemas.openxmlformats.org/presentationml/2006/main">
+  <p:cSld>
+    <p:spTree>
+      <p:nvGrpSpPr>
+        <p:cNvPr id="1" name=""/>
+        <p:cNvGrpSpPr/>
+        <p:nvPr/>
+      </p:nvGrpSpPr>
+      <p:grpSpPr>
+        <a:xfrm>
+          <a:off x="0" y="0"/>
+          <a:ext cx="0" cy="0"/>
+          <a:chOff x="0" y="0"/>
+          <a:chExt cx="0" cy="0"/>
+        </a:xfrm>
+      </p:grpSpPr>
+      <p:sp>
+        <p:nvSpPr>
+          <p:cNvPr id="2" name="标题 1"/>
+          <p:cNvSpPr>
+            <a:spLocks noGrp="1"/>
+          </p:cNvSpPr>
+          <p:nvPr>
+            <p:ph type="title"/>
+          </p:nvPr>
+        </p:nvSpPr>
+        <p:spPr>
+          <a:xfrm>
+            <a:off x="391629" y="429776"/>
+            <a:ext cx="6701898" cy="829647"/>
+          </a:xfrm>
+        </p:spPr>
+        <p:txBody>
+          <a:bodyPr>
+            <a:normAutofit fontScale="90000"/>
+          </a:bodyPr>
+          <a:lstStyle/>
+          <a:p>
+            <a:r>
+              <a:rPr lang="en-US" dirty="0">
+                <a:latin typeface="Montserrat Light"/>
+              </a:rPr>
+              <a:t>Use Case (B2B2B2C) – Property Manager</a:t>
+            </a:r>
+            <a:endParaRPr lang="en-US" dirty="0"/>
+          </a:p>
+        </p:txBody>
+      </p:sp>
+      <p:sp>
+        <p:nvSpPr>
+          <p:cNvPr id="9" name="Content Placeholder 2">
+            <a:extLst>
+              <a:ext uri="{FF2B5EF4-FFF2-40B4-BE49-F238E27FC236}">
+                <a16:creationId xmlns:a16="http://schemas.microsoft.com/office/drawing/2014/main" id="{89AD1F4F-9788-A65D-7A16-76A9D6CB9AE9}"/>
+              </a:ext>
+            </a:extLst>
+          </p:cNvPr>
+          <p:cNvSpPr txBox="1">
+            <a:spLocks/>
+          </p:cNvSpPr>
+          <p:nvPr/>
+        </p:nvSpPr>
+        <p:spPr>
+          <a:xfrm>
+            <a:off x="282546" y="2111332"/>
+            <a:ext cx="5338862" cy="1626706"/>
+          </a:xfrm>
+          <a:prstGeom prst="rect">
+            <a:avLst/>
+          </a:prstGeom>
+          <a:solidFill>
+            <a:srgbClr val="B3DFF3"/>
+          </a:solidFill>
+        </p:spPr>
+        <p:txBody>
+          <a:bodyPr vert="horz" lIns="91440" tIns="45720" rIns="91440" bIns="45720" rtlCol="0" anchor="ctr">
+            <a:normAutofit fontScale="92500" lnSpcReduction="20000"/>
+          </a:bodyPr>
+          <a:lstStyle>
+            <a:lvl1pPr marL="228600" indent="-228600" algn="l" defTabSz="914400" rtl="0" eaLnBrk="1" latinLnBrk="0" hangingPunct="1">
+              <a:lnSpc>
+                <a:spcPct val="90000"/>
+              </a:lnSpc>
+              <a:spcBef>
+                <a:spcPts val="1000"/>
+              </a:spcBef>
+              <a:buFont typeface="Arial" panose="020B0604020202020204" pitchFamily="34" charset="0"/>
+              <a:buChar char="•"/>
+              <a:defRPr sz="2800" kern="1200">
+                <a:solidFill>
+                  <a:schemeClr val="tx1"/>
+                </a:solidFill>
+                <a:latin typeface="+mn-lt"/>
+                <a:ea typeface="+mn-ea"/>
+                <a:cs typeface="+mn-cs"/>
+              </a:defRPr>
+            </a:lvl1pPr>
+            <a:lvl2pPr marL="685800" indent="-228600" algn="l" defTabSz="914400" rtl="0" eaLnBrk="1" latinLnBrk="0" hangingPunct="1">
+              <a:lnSpc>
+                <a:spcPct val="90000"/>
+              </a:lnSpc>
+              <a:spcBef>
+                <a:spcPts val="500"/>
+              </a:spcBef>
+              <a:buFont typeface="Arial" panose="020B0604020202020204" pitchFamily="34" charset="0"/>
+              <a:buChar char="•"/>
+              <a:defRPr sz="2400" kern="1200">
+                <a:solidFill>
+                  <a:schemeClr val="tx1"/>
+                </a:solidFill>
+                <a:latin typeface="+mn-lt"/>
+                <a:ea typeface="+mn-ea"/>
+                <a:cs typeface="+mn-cs"/>
+              </a:defRPr>
+            </a:lvl2pPr>
+            <a:lvl3pPr marL="1143000" indent="-228600" algn="l" defTabSz="914400" rtl="0" eaLnBrk="1" latinLnBrk="0" hangingPunct="1">
+              <a:lnSpc>
+                <a:spcPct val="90000"/>
+              </a:lnSpc>
+              <a:spcBef>
+                <a:spcPts val="500"/>
+              </a:spcBef>
+              <a:buFont typeface="Arial" panose="020B0604020202020204" pitchFamily="34" charset="0"/>
+              <a:buChar char="•"/>
+              <a:defRPr sz="2000" kern="1200">
+                <a:solidFill>
+                  <a:schemeClr val="tx1"/>
+                </a:solidFill>
+                <a:latin typeface="+mn-lt"/>
+                <a:ea typeface="+mn-ea"/>
+                <a:cs typeface="+mn-cs"/>
+              </a:defRPr>
+            </a:lvl3pPr>
+            <a:lvl4pPr marL="1600200" indent="-228600" algn="l" defTabSz="914400" rtl="0" eaLnBrk="1" latinLnBrk="0" hangingPunct="1">
+              <a:lnSpc>
+                <a:spcPct val="90000"/>
+              </a:lnSpc>
+              <a:spcBef>
+                <a:spcPts val="500"/>
+              </a:spcBef>
+              <a:buFont typeface="Arial" panose="020B0604020202020204" pitchFamily="34" charset="0"/>
+              <a:buChar char="•"/>
+              <a:defRPr sz="1800" kern="1200">
+                <a:solidFill>
+                  <a:schemeClr val="tx1"/>
+                </a:solidFill>
+                <a:latin typeface="+mn-lt"/>
+                <a:ea typeface="+mn-ea"/>
+                <a:cs typeface="+mn-cs"/>
+              </a:defRPr>
+            </a:lvl4pPr>
+            <a:lvl5pPr marL="2057400" indent="-228600" algn="l" defTabSz="914400" rtl="0" eaLnBrk="1" latinLnBrk="0" hangingPunct="1">
+              <a:lnSpc>
+                <a:spcPct val="90000"/>
+              </a:lnSpc>
+              <a:spcBef>
+                <a:spcPts val="500"/>
+              </a:spcBef>
+              <a:buFont typeface="Arial" panose="020B0604020202020204" pitchFamily="34" charset="0"/>
+              <a:buChar char="•"/>
+              <a:defRPr sz="1800" kern="1200">
+                <a:solidFill>
+                  <a:schemeClr val="tx1"/>
+                </a:solidFill>
+                <a:latin typeface="+mn-lt"/>
+                <a:ea typeface="+mn-ea"/>
+                <a:cs typeface="+mn-cs"/>
+              </a:defRPr>
+            </a:lvl5pPr>
+            <a:lvl6pPr marL="2514600" indent="-228600" algn="l" defTabSz="914400" rtl="0" eaLnBrk="1" latinLnBrk="0" hangingPunct="1">
+              <a:lnSpc>
+                <a:spcPct val="90000"/>
+              </a:lnSpc>
+              <a:spcBef>
+                <a:spcPts val="500"/>
+              </a:spcBef>
+              <a:buFont typeface="Arial" panose="020B0604020202020204" pitchFamily="34" charset="0"/>
+              <a:buChar char="•"/>
+              <a:defRPr sz="1800" kern="1200">
+                <a:solidFill>
+                  <a:schemeClr val="tx1"/>
+                </a:solidFill>
+                <a:latin typeface="+mn-lt"/>
+                <a:ea typeface="+mn-ea"/>
+                <a:cs typeface="+mn-cs"/>
+              </a:defRPr>
+            </a:lvl6pPr>
+            <a:lvl7pPr marL="2971800" indent="-228600" algn="l" defTabSz="914400" rtl="0" eaLnBrk="1" latinLnBrk="0" hangingPunct="1">
+              <a:lnSpc>
+                <a:spcPct val="90000"/>
+              </a:lnSpc>
+              <a:spcBef>
+                <a:spcPts val="500"/>
+              </a:spcBef>
+              <a:buFont typeface="Arial" panose="020B0604020202020204" pitchFamily="34" charset="0"/>
+              <a:buChar char="•"/>
+              <a:defRPr sz="1800" kern="1200">
+                <a:solidFill>
+                  <a:schemeClr val="tx1"/>
+                </a:solidFill>
+                <a:latin typeface="+mn-lt"/>
+                <a:ea typeface="+mn-ea"/>
+                <a:cs typeface="+mn-cs"/>
+              </a:defRPr>
+            </a:lvl7pPr>
+            <a:lvl8pPr marL="3429000" indent="-228600" algn="l" defTabSz="914400" rtl="0" eaLnBrk="1" latinLnBrk="0" hangingPunct="1">
+              <a:lnSpc>
+                <a:spcPct val="90000"/>
+              </a:lnSpc>
+              <a:spcBef>
+                <a:spcPts val="500"/>
+              </a:spcBef>
+              <a:buFont typeface="Arial" panose="020B0604020202020204" pitchFamily="34" charset="0"/>
+              <a:buChar char="•"/>
+              <a:defRPr sz="1800" kern="1200">
+                <a:solidFill>
+                  <a:schemeClr val="tx1"/>
+                </a:solidFill>
+                <a:latin typeface="+mn-lt"/>
+                <a:ea typeface="+mn-ea"/>
+                <a:cs typeface="+mn-cs"/>
+              </a:defRPr>
+            </a:lvl8pPr>
+            <a:lvl9pPr marL="3886200" indent="-228600" algn="l" defTabSz="914400" rtl="0" eaLnBrk="1" latinLnBrk="0" hangingPunct="1">
+              <a:lnSpc>
+                <a:spcPct val="90000"/>
+              </a:lnSpc>
+              <a:spcBef>
+                <a:spcPts val="500"/>
+              </a:spcBef>
+              <a:buFont typeface="Arial" panose="020B0604020202020204" pitchFamily="34" charset="0"/>
+              <a:buChar char="•"/>
+              <a:defRPr sz="1800" kern="1200">
+                <a:solidFill>
+                  <a:schemeClr val="tx1"/>
+                </a:solidFill>
+                <a:latin typeface="+mn-lt"/>
+                <a:ea typeface="+mn-ea"/>
+                <a:cs typeface="+mn-cs"/>
+              </a:defRPr>
+            </a:lvl9pPr>
+          </a:lstStyle>
+          <a:p>
+            <a:pPr marL="0" indent="0" algn="ctr">
+              <a:buNone/>
+            </a:pPr>
+            <a:r>
+              <a:rPr lang="en-US" sz="1800" dirty="0"/>
+              <a:t>Example hospitality use case where the property manager is the subscriber of services providing internet as an amenity through a 3rd-party reseller with a tenant portal.</a:t>
+            </a:r>
+            <a:br>
+              <a:rPr lang="en-US" sz="1800" dirty="0">
+                <a:ea typeface="Calibri"/>
+                <a:cs typeface="Calibri"/>
+              </a:rPr>
+            </a:br>
+            <a:br>
+              <a:rPr lang="en-US" sz="1800" dirty="0">
+                <a:solidFill>
+                  <a:srgbClr val="FF0000"/>
+                </a:solidFill>
+                <a:ea typeface="Calibri"/>
+                <a:cs typeface="Calibri"/>
+              </a:rPr>
+            </a:br>
+            <a:r>
+              <a:rPr lang="en-US" sz="1800" dirty="0">
+                <a:solidFill>
+                  <a:srgbClr val="FF0000"/>
+                </a:solidFill>
+                <a:ea typeface="Calibri"/>
+                <a:cs typeface="Calibri"/>
+              </a:rPr>
+              <a:t>Property manager may have tens of thousands of units in their portfolio making it prohibitive to target a specific tenant without an equipment to unit mapping supplied by the network operator.</a:t>
+            </a:r>
+          </a:p>
+        </p:txBody>
+      </p:sp>
+      <p:pic>
+        <p:nvPicPr>
+          <p:cNvPr id="4" name="Picture 3" descr="A diagram of a property manager&#10;&#10;Description automatically generated">
+            <a:extLst>
+              <a:ext uri="{FF2B5EF4-FFF2-40B4-BE49-F238E27FC236}">
+                <a16:creationId xmlns:a16="http://schemas.microsoft.com/office/drawing/2014/main" id="{33C5812D-E9E2-C0D9-80B9-7884A71B1A5C}"/>
+              </a:ext>
+            </a:extLst>
+          </p:cNvPr>
+          <p:cNvPicPr>
+            <a:picLocks noChangeAspect="1"/>
+          </p:cNvPicPr>
+          <p:nvPr/>
+        </p:nvPicPr>
+        <p:blipFill>
+          <a:blip r:embed="rId3"/>
+          <a:stretch>
+            <a:fillRect/>
+          </a:stretch>
+        </p:blipFill>
+        <p:spPr>
+          <a:xfrm>
+            <a:off x="7543800" y="1524000"/>
+            <a:ext cx="4374984" cy="4902200"/>
+          </a:xfrm>
+          <a:prstGeom prst="rect">
+            <a:avLst/>
+          </a:prstGeom>
+        </p:spPr>
+      </p:pic>
+      <p:pic>
+        <p:nvPicPr>
+          <p:cNvPr id="5" name="Picture 4" descr="A screenshot of a computer&#10;&#10;Description automatically generated">
+            <a:extLst>
+              <a:ext uri="{FF2B5EF4-FFF2-40B4-BE49-F238E27FC236}">
+                <a16:creationId xmlns:a16="http://schemas.microsoft.com/office/drawing/2014/main" id="{AFAB3998-C7C6-A3A9-7150-C2D1E7083A30}"/>
+              </a:ext>
+            </a:extLst>
+          </p:cNvPr>
+          <p:cNvPicPr>
+            <a:picLocks noChangeAspect="1"/>
+          </p:cNvPicPr>
+          <p:nvPr/>
+        </p:nvPicPr>
+        <p:blipFill>
+          <a:blip r:embed="rId4"/>
+          <a:stretch>
+            <a:fillRect/>
+          </a:stretch>
+        </p:blipFill>
+        <p:spPr>
+          <a:xfrm>
+            <a:off x="203200" y="3860800"/>
+            <a:ext cx="7823200" cy="2770113"/>
+          </a:xfrm>
+          <a:prstGeom prst="rect">
+            <a:avLst/>
+          </a:prstGeom>
+        </p:spPr>
+      </p:pic>
+    </p:spTree>
+    <p:extLst>
+      <p:ext uri="{BB962C8B-B14F-4D97-AF65-F5344CB8AC3E}">
+        <p14:creationId xmlns:p14="http://schemas.microsoft.com/office/powerpoint/2010/main" val="2156071148"/>
+      </p:ext>
+    </p:extLst>
+  </p:cSld>
+  <p:clrMapOvr>
+    <a:masterClrMapping/>
+  </p:clrMapOvr>
+</p:sld>
+</file>
+
+<file path=ppt/slides/slide6.xml><?xml version="1.0" encoding="utf-8"?>
+<p:sld xmlns:a="http://schemas.openxmlformats.org/drawingml/2006/main" xmlns:r="http://schemas.openxmlformats.org/officeDocument/2006/relationships" xmlns:p="http://schemas.openxmlformats.org/presentationml/2006/main">
+  <p:cSld>
+    <p:spTree>
+      <p:nvGrpSpPr>
+        <p:cNvPr id="1" name=""/>
+        <p:cNvGrpSpPr/>
+        <p:nvPr/>
+      </p:nvGrpSpPr>
+      <p:grpSpPr>
+        <a:xfrm>
+          <a:off x="0" y="0"/>
+          <a:ext cx="0" cy="0"/>
+          <a:chOff x="0" y="0"/>
+          <a:chExt cx="0" cy="0"/>
+        </a:xfrm>
+      </p:grpSpPr>
+      <p:sp>
+        <p:nvSpPr>
+          <p:cNvPr id="2" name="标题 1"/>
+          <p:cNvSpPr>
+            <a:spLocks noGrp="1"/>
+          </p:cNvSpPr>
+          <p:nvPr>
+            <p:ph type="title"/>
+          </p:nvPr>
+        </p:nvSpPr>
+        <p:spPr>
+          <a:xfrm>
+            <a:off x="391629" y="429776"/>
+            <a:ext cx="6701898" cy="829647"/>
+          </a:xfrm>
+        </p:spPr>
+        <p:txBody>
+          <a:bodyPr>
+            <a:noAutofit/>
+          </a:bodyPr>
+          <a:lstStyle/>
+          <a:p>
+            <a:r>
+              <a:rPr lang="en-US" sz="3200" dirty="0">
+                <a:latin typeface="Montserrat Light"/>
+              </a:rPr>
+              <a:t>Use Case (B2B2B2C) – Property Manager – Tenant </a:t>
+            </a:r>
+            <a:br>
+              <a:rPr lang="en-US" sz="3200" dirty="0">
+                <a:latin typeface="Montserrat Light"/>
+              </a:rPr>
+            </a:br>
+            <a:r>
+              <a:rPr lang="en-US" sz="3200" dirty="0">
+                <a:latin typeface="Montserrat Light"/>
+              </a:rPr>
+              <a:t>Subscriber</a:t>
+            </a:r>
+            <a:endParaRPr lang="en-US" sz="3200" dirty="0"/>
+          </a:p>
+        </p:txBody>
+      </p:sp>
+      <p:sp>
+        <p:nvSpPr>
+          <p:cNvPr id="9" name="Content Placeholder 2">
+            <a:extLst>
+              <a:ext uri="{FF2B5EF4-FFF2-40B4-BE49-F238E27FC236}">
+                <a16:creationId xmlns:a16="http://schemas.microsoft.com/office/drawing/2014/main" id="{4ADE3EF8-F556-E16C-8C22-7C114456F24C}"/>
+              </a:ext>
+            </a:extLst>
+          </p:cNvPr>
+          <p:cNvSpPr txBox="1">
+            <a:spLocks/>
+          </p:cNvSpPr>
+          <p:nvPr/>
+        </p:nvSpPr>
+        <p:spPr>
+          <a:xfrm>
+            <a:off x="282546" y="2111332"/>
+            <a:ext cx="5338862" cy="1220966"/>
+          </a:xfrm>
+          <a:prstGeom prst="rect">
+            <a:avLst/>
+          </a:prstGeom>
+          <a:solidFill>
+            <a:srgbClr val="B3DFF3"/>
+          </a:solidFill>
+        </p:spPr>
+        <p:txBody>
+          <a:bodyPr vert="horz" lIns="91440" tIns="45720" rIns="91440" bIns="45720" rtlCol="0" anchor="ctr">
+            <a:normAutofit/>
+          </a:bodyPr>
+          <a:lstStyle>
+            <a:lvl1pPr marL="228600" indent="-228600" algn="l" defTabSz="914400" rtl="0" eaLnBrk="1" latinLnBrk="0" hangingPunct="1">
+              <a:lnSpc>
+                <a:spcPct val="90000"/>
+              </a:lnSpc>
+              <a:spcBef>
+                <a:spcPts val="1000"/>
+              </a:spcBef>
+              <a:buFont typeface="Arial" panose="020B0604020202020204" pitchFamily="34" charset="0"/>
+              <a:buChar char="•"/>
+              <a:defRPr sz="2800" kern="1200">
+                <a:solidFill>
+                  <a:schemeClr val="tx1"/>
+                </a:solidFill>
+                <a:latin typeface="+mn-lt"/>
+                <a:ea typeface="+mn-ea"/>
+                <a:cs typeface="+mn-cs"/>
+              </a:defRPr>
+            </a:lvl1pPr>
+            <a:lvl2pPr marL="685800" indent="-228600" algn="l" defTabSz="914400" rtl="0" eaLnBrk="1" latinLnBrk="0" hangingPunct="1">
+              <a:lnSpc>
+                <a:spcPct val="90000"/>
+              </a:lnSpc>
+              <a:spcBef>
+                <a:spcPts val="500"/>
+              </a:spcBef>
+              <a:buFont typeface="Arial" panose="020B0604020202020204" pitchFamily="34" charset="0"/>
+              <a:buChar char="•"/>
+              <a:defRPr sz="2400" kern="1200">
+                <a:solidFill>
+                  <a:schemeClr val="tx1"/>
+                </a:solidFill>
+                <a:latin typeface="+mn-lt"/>
+                <a:ea typeface="+mn-ea"/>
+                <a:cs typeface="+mn-cs"/>
+              </a:defRPr>
+            </a:lvl2pPr>
+            <a:lvl3pPr marL="1143000" indent="-228600" algn="l" defTabSz="914400" rtl="0" eaLnBrk="1" latinLnBrk="0" hangingPunct="1">
+              <a:lnSpc>
+                <a:spcPct val="90000"/>
+              </a:lnSpc>
+              <a:spcBef>
+                <a:spcPts val="500"/>
+              </a:spcBef>
+              <a:buFont typeface="Arial" panose="020B0604020202020204" pitchFamily="34" charset="0"/>
+              <a:buChar char="•"/>
+              <a:defRPr sz="2000" kern="1200">
+                <a:solidFill>
+                  <a:schemeClr val="tx1"/>
+                </a:solidFill>
+                <a:latin typeface="+mn-lt"/>
+                <a:ea typeface="+mn-ea"/>
+                <a:cs typeface="+mn-cs"/>
+              </a:defRPr>
+            </a:lvl3pPr>
+            <a:lvl4pPr marL="1600200" indent="-228600" algn="l" defTabSz="914400" rtl="0" eaLnBrk="1" latinLnBrk="0" hangingPunct="1">
+              <a:lnSpc>
+                <a:spcPct val="90000"/>
+              </a:lnSpc>
+              <a:spcBef>
+                <a:spcPts val="500"/>
+              </a:spcBef>
+              <a:buFont typeface="Arial" panose="020B0604020202020204" pitchFamily="34" charset="0"/>
+              <a:buChar char="•"/>
+              <a:defRPr sz="1800" kern="1200">
+                <a:solidFill>
+                  <a:schemeClr val="tx1"/>
+                </a:solidFill>
+                <a:latin typeface="+mn-lt"/>
+                <a:ea typeface="+mn-ea"/>
+                <a:cs typeface="+mn-cs"/>
+              </a:defRPr>
+            </a:lvl4pPr>
+            <a:lvl5pPr marL="2057400" indent="-228600" algn="l" defTabSz="914400" rtl="0" eaLnBrk="1" latinLnBrk="0" hangingPunct="1">
+              <a:lnSpc>
+                <a:spcPct val="90000"/>
+              </a:lnSpc>
+              <a:spcBef>
+                <a:spcPts val="500"/>
+              </a:spcBef>
+              <a:buFont typeface="Arial" panose="020B0604020202020204" pitchFamily="34" charset="0"/>
+              <a:buChar char="•"/>
+              <a:defRPr sz="1800" kern="1200">
+                <a:solidFill>
+                  <a:schemeClr val="tx1"/>
+                </a:solidFill>
+                <a:latin typeface="+mn-lt"/>
+                <a:ea typeface="+mn-ea"/>
+                <a:cs typeface="+mn-cs"/>
+              </a:defRPr>
+            </a:lvl5pPr>
+            <a:lvl6pPr marL="2514600" indent="-228600" algn="l" defTabSz="914400" rtl="0" eaLnBrk="1" latinLnBrk="0" hangingPunct="1">
+              <a:lnSpc>
+                <a:spcPct val="90000"/>
+              </a:lnSpc>
+              <a:spcBef>
+                <a:spcPts val="500"/>
+              </a:spcBef>
+              <a:buFont typeface="Arial" panose="020B0604020202020204" pitchFamily="34" charset="0"/>
+              <a:buChar char="•"/>
+              <a:defRPr sz="1800" kern="1200">
+                <a:solidFill>
+                  <a:schemeClr val="tx1"/>
+                </a:solidFill>
+                <a:latin typeface="+mn-lt"/>
+                <a:ea typeface="+mn-ea"/>
+                <a:cs typeface="+mn-cs"/>
+              </a:defRPr>
+            </a:lvl6pPr>
+            <a:lvl7pPr marL="2971800" indent="-228600" algn="l" defTabSz="914400" rtl="0" eaLnBrk="1" latinLnBrk="0" hangingPunct="1">
+              <a:lnSpc>
+                <a:spcPct val="90000"/>
+              </a:lnSpc>
+              <a:spcBef>
+                <a:spcPts val="500"/>
+              </a:spcBef>
+              <a:buFont typeface="Arial" panose="020B0604020202020204" pitchFamily="34" charset="0"/>
+              <a:buChar char="•"/>
+              <a:defRPr sz="1800" kern="1200">
+                <a:solidFill>
+                  <a:schemeClr val="tx1"/>
+                </a:solidFill>
+                <a:latin typeface="+mn-lt"/>
+                <a:ea typeface="+mn-ea"/>
+                <a:cs typeface="+mn-cs"/>
+              </a:defRPr>
+            </a:lvl7pPr>
+            <a:lvl8pPr marL="3429000" indent="-228600" algn="l" defTabSz="914400" rtl="0" eaLnBrk="1" latinLnBrk="0" hangingPunct="1">
+              <a:lnSpc>
+                <a:spcPct val="90000"/>
+              </a:lnSpc>
+              <a:spcBef>
+                <a:spcPts val="500"/>
+              </a:spcBef>
+              <a:buFont typeface="Arial" panose="020B0604020202020204" pitchFamily="34" charset="0"/>
+              <a:buChar char="•"/>
+              <a:defRPr sz="1800" kern="1200">
+                <a:solidFill>
+                  <a:schemeClr val="tx1"/>
+                </a:solidFill>
+                <a:latin typeface="+mn-lt"/>
+                <a:ea typeface="+mn-ea"/>
+                <a:cs typeface="+mn-cs"/>
+              </a:defRPr>
+            </a:lvl8pPr>
+            <a:lvl9pPr marL="3886200" indent="-228600" algn="l" defTabSz="914400" rtl="0" eaLnBrk="1" latinLnBrk="0" hangingPunct="1">
+              <a:lnSpc>
+                <a:spcPct val="90000"/>
+              </a:lnSpc>
+              <a:spcBef>
+                <a:spcPts val="500"/>
+              </a:spcBef>
+              <a:buFont typeface="Arial" panose="020B0604020202020204" pitchFamily="34" charset="0"/>
+              <a:buChar char="•"/>
+              <a:defRPr sz="1800" kern="1200">
+                <a:solidFill>
+                  <a:schemeClr val="tx1"/>
+                </a:solidFill>
+                <a:latin typeface="+mn-lt"/>
+                <a:ea typeface="+mn-ea"/>
+                <a:cs typeface="+mn-cs"/>
+              </a:defRPr>
+            </a:lvl9pPr>
+          </a:lstStyle>
+          <a:p>
+            <a:pPr marL="0" indent="0" algn="ctr">
+              <a:buNone/>
+            </a:pPr>
+            <a:r>
+              <a:rPr lang="en-US" sz="1800"/>
+              <a:t>Example hospitality use case where the property manager offers network management through a tenant portal provided by a 3rd-Party as an amenity.  The tenant is the subscriber and must individually consent.</a:t>
+            </a:r>
+            <a:endParaRPr lang="en-US" sz="1800">
+              <a:ea typeface="Calibri"/>
+              <a:cs typeface="Calibri"/>
+            </a:endParaRPr>
+          </a:p>
+        </p:txBody>
+      </p:sp>
+      <p:pic>
+        <p:nvPicPr>
+          <p:cNvPr id="3" name="Picture 2" descr="A diagram of a property manager&#10;&#10;Description automatically generated">
+            <a:extLst>
+              <a:ext uri="{FF2B5EF4-FFF2-40B4-BE49-F238E27FC236}">
+                <a16:creationId xmlns:a16="http://schemas.microsoft.com/office/drawing/2014/main" id="{E1815C3E-88F3-E093-CDE3-7DF15F920C22}"/>
+              </a:ext>
+            </a:extLst>
+          </p:cNvPr>
+          <p:cNvPicPr>
+            <a:picLocks noChangeAspect="1"/>
+          </p:cNvPicPr>
+          <p:nvPr/>
+        </p:nvPicPr>
+        <p:blipFill>
+          <a:blip r:embed="rId3"/>
+          <a:stretch>
+            <a:fillRect/>
+          </a:stretch>
+        </p:blipFill>
+        <p:spPr>
+          <a:xfrm>
+            <a:off x="6216896" y="1477984"/>
+            <a:ext cx="5818910" cy="3711416"/>
+          </a:xfrm>
+          <a:prstGeom prst="rect">
+            <a:avLst/>
+          </a:prstGeom>
+        </p:spPr>
+      </p:pic>
+      <p:pic>
+        <p:nvPicPr>
+          <p:cNvPr id="5" name="Picture 4" descr="A screenshot of a computer&#10;&#10;Description automatically generated">
+            <a:extLst>
+              <a:ext uri="{FF2B5EF4-FFF2-40B4-BE49-F238E27FC236}">
+                <a16:creationId xmlns:a16="http://schemas.microsoft.com/office/drawing/2014/main" id="{683E07A6-C5E4-ECBD-B618-1B5A6B0E86FC}"/>
+              </a:ext>
+            </a:extLst>
+          </p:cNvPr>
+          <p:cNvPicPr>
+            <a:picLocks noChangeAspect="1"/>
+          </p:cNvPicPr>
+          <p:nvPr/>
+        </p:nvPicPr>
+        <p:blipFill>
+          <a:blip r:embed="rId4"/>
+          <a:stretch>
+            <a:fillRect/>
+          </a:stretch>
+        </p:blipFill>
+        <p:spPr>
+          <a:xfrm>
+            <a:off x="143164" y="4152405"/>
+            <a:ext cx="6600701" cy="2544307"/>
+          </a:xfrm>
+          <a:prstGeom prst="rect">
+            <a:avLst/>
+          </a:prstGeom>
+        </p:spPr>
+      </p:pic>
+    </p:spTree>
+    <p:extLst>
+      <p:ext uri="{BB962C8B-B14F-4D97-AF65-F5344CB8AC3E}">
+        <p14:creationId xmlns:p14="http://schemas.microsoft.com/office/powerpoint/2010/main" val="263075917"/>
+      </p:ext>
+    </p:extLst>
+  </p:cSld>
+  <p:clrMapOvr>
+    <a:masterClrMapping/>
+  </p:clrMapOvr>
+</p:sld>
+</file>
+
+<file path=ppt/slides/slide7.xml><?xml version="1.0" encoding="utf-8"?>
+<p:sld xmlns:a="http://schemas.openxmlformats.org/drawingml/2006/main" xmlns:r="http://schemas.openxmlformats.org/officeDocument/2006/relationships" xmlns:p="http://schemas.openxmlformats.org/presentationml/2006/main">
+  <p:cSld>
+    <p:spTree>
+      <p:nvGrpSpPr>
+        <p:cNvPr id="1" name=""/>
+        <p:cNvGrpSpPr/>
+        <p:nvPr/>
+      </p:nvGrpSpPr>
+      <p:grpSpPr>
+        <a:xfrm>
+          <a:off x="0" y="0"/>
+          <a:ext cx="0" cy="0"/>
+          <a:chOff x="0" y="0"/>
+          <a:chExt cx="0" cy="0"/>
+        </a:xfrm>
+      </p:grpSpPr>
+      <p:sp>
+        <p:nvSpPr>
+          <p:cNvPr id="2" name="标题 1"/>
+          <p:cNvSpPr>
+            <a:spLocks noGrp="1"/>
+          </p:cNvSpPr>
+          <p:nvPr>
+            <p:ph type="title"/>
+          </p:nvPr>
+        </p:nvSpPr>
+        <p:spPr>
+          <a:xfrm>
+            <a:off x="391629" y="429776"/>
+            <a:ext cx="6701898" cy="829647"/>
+          </a:xfrm>
+        </p:spPr>
+        <p:txBody>
+          <a:bodyPr>
+            <a:normAutofit fontScale="90000"/>
+          </a:bodyPr>
+          <a:lstStyle/>
+          <a:p>
+            <a:r>
+              <a:rPr lang="en-US" dirty="0">
+                <a:latin typeface="Montserrat Light"/>
+              </a:rPr>
+              <a:t>Use Case (B2C) – Power User</a:t>
+            </a:r>
+            <a:endParaRPr lang="en-US" dirty="0"/>
+          </a:p>
+        </p:txBody>
+      </p:sp>
+      <p:sp>
+        <p:nvSpPr>
+          <p:cNvPr id="8" name="Content Placeholder 2">
+            <a:extLst>
+              <a:ext uri="{FF2B5EF4-FFF2-40B4-BE49-F238E27FC236}">
+                <a16:creationId xmlns:a16="http://schemas.microsoft.com/office/drawing/2014/main" id="{922815B8-9534-2793-E9C2-59EE9258AA8F}"/>
+              </a:ext>
+            </a:extLst>
+          </p:cNvPr>
+          <p:cNvSpPr txBox="1">
+            <a:spLocks/>
+          </p:cNvSpPr>
+          <p:nvPr/>
+        </p:nvSpPr>
+        <p:spPr>
+          <a:xfrm>
+            <a:off x="282546" y="2111332"/>
+            <a:ext cx="5338862" cy="1220966"/>
+          </a:xfrm>
+          <a:prstGeom prst="rect">
+            <a:avLst/>
+          </a:prstGeom>
+          <a:solidFill>
+            <a:srgbClr val="B3DFF3"/>
+          </a:solidFill>
+        </p:spPr>
+        <p:txBody>
+          <a:bodyPr vert="horz" lIns="91440" tIns="45720" rIns="91440" bIns="45720" rtlCol="0" anchor="ctr">
+            <a:normAutofit/>
+          </a:bodyPr>
+          <a:lstStyle>
+            <a:lvl1pPr marL="228600" indent="-228600" algn="l" defTabSz="914400" rtl="0" eaLnBrk="1" latinLnBrk="0" hangingPunct="1">
+              <a:lnSpc>
+                <a:spcPct val="90000"/>
+              </a:lnSpc>
+              <a:spcBef>
+                <a:spcPts val="1000"/>
+              </a:spcBef>
+              <a:buFont typeface="Arial" panose="020B0604020202020204" pitchFamily="34" charset="0"/>
+              <a:buChar char="•"/>
+              <a:defRPr sz="2800" kern="1200">
+                <a:solidFill>
+                  <a:schemeClr val="tx1"/>
+                </a:solidFill>
+                <a:latin typeface="+mn-lt"/>
+                <a:ea typeface="+mn-ea"/>
+                <a:cs typeface="+mn-cs"/>
+              </a:defRPr>
+            </a:lvl1pPr>
+            <a:lvl2pPr marL="685800" indent="-228600" algn="l" defTabSz="914400" rtl="0" eaLnBrk="1" latinLnBrk="0" hangingPunct="1">
+              <a:lnSpc>
+                <a:spcPct val="90000"/>
+              </a:lnSpc>
+              <a:spcBef>
+                <a:spcPts val="500"/>
+              </a:spcBef>
+              <a:buFont typeface="Arial" panose="020B0604020202020204" pitchFamily="34" charset="0"/>
+              <a:buChar char="•"/>
+              <a:defRPr sz="2400" kern="1200">
+                <a:solidFill>
+                  <a:schemeClr val="tx1"/>
+                </a:solidFill>
+                <a:latin typeface="+mn-lt"/>
+                <a:ea typeface="+mn-ea"/>
+                <a:cs typeface="+mn-cs"/>
+              </a:defRPr>
+            </a:lvl2pPr>
+            <a:lvl3pPr marL="1143000" indent="-228600" algn="l" defTabSz="914400" rtl="0" eaLnBrk="1" latinLnBrk="0" hangingPunct="1">
+              <a:lnSpc>
+                <a:spcPct val="90000"/>
+              </a:lnSpc>
+              <a:spcBef>
+                <a:spcPts val="500"/>
+              </a:spcBef>
+              <a:buFont typeface="Arial" panose="020B0604020202020204" pitchFamily="34" charset="0"/>
+              <a:buChar char="•"/>
+              <a:defRPr sz="2000" kern="1200">
+                <a:solidFill>
+                  <a:schemeClr val="tx1"/>
+                </a:solidFill>
+                <a:latin typeface="+mn-lt"/>
+                <a:ea typeface="+mn-ea"/>
+                <a:cs typeface="+mn-cs"/>
+              </a:defRPr>
+            </a:lvl3pPr>
+            <a:lvl4pPr marL="1600200" indent="-228600" algn="l" defTabSz="914400" rtl="0" eaLnBrk="1" latinLnBrk="0" hangingPunct="1">
+              <a:lnSpc>
+                <a:spcPct val="90000"/>
+              </a:lnSpc>
+              <a:spcBef>
+                <a:spcPts val="500"/>
+              </a:spcBef>
+              <a:buFont typeface="Arial" panose="020B0604020202020204" pitchFamily="34" charset="0"/>
+              <a:buChar char="•"/>
+              <a:defRPr sz="1800" kern="1200">
+                <a:solidFill>
+                  <a:schemeClr val="tx1"/>
+                </a:solidFill>
+                <a:latin typeface="+mn-lt"/>
+                <a:ea typeface="+mn-ea"/>
+                <a:cs typeface="+mn-cs"/>
+              </a:defRPr>
+            </a:lvl4pPr>
+            <a:lvl5pPr marL="2057400" indent="-228600" algn="l" defTabSz="914400" rtl="0" eaLnBrk="1" latinLnBrk="0" hangingPunct="1">
+              <a:lnSpc>
+                <a:spcPct val="90000"/>
+              </a:lnSpc>
+              <a:spcBef>
+                <a:spcPts val="500"/>
+              </a:spcBef>
+              <a:buFont typeface="Arial" panose="020B0604020202020204" pitchFamily="34" charset="0"/>
+              <a:buChar char="•"/>
+              <a:defRPr sz="1800" kern="1200">
+                <a:solidFill>
+                  <a:schemeClr val="tx1"/>
+                </a:solidFill>
+                <a:latin typeface="+mn-lt"/>
+                <a:ea typeface="+mn-ea"/>
+                <a:cs typeface="+mn-cs"/>
+              </a:defRPr>
+            </a:lvl5pPr>
+            <a:lvl6pPr marL="2514600" indent="-228600" algn="l" defTabSz="914400" rtl="0" eaLnBrk="1" latinLnBrk="0" hangingPunct="1">
+              <a:lnSpc>
+                <a:spcPct val="90000"/>
+              </a:lnSpc>
+              <a:spcBef>
+                <a:spcPts val="500"/>
+              </a:spcBef>
+              <a:buFont typeface="Arial" panose="020B0604020202020204" pitchFamily="34" charset="0"/>
+              <a:buChar char="•"/>
+              <a:defRPr sz="1800" kern="1200">
+                <a:solidFill>
+                  <a:schemeClr val="tx1"/>
+                </a:solidFill>
+                <a:latin typeface="+mn-lt"/>
+                <a:ea typeface="+mn-ea"/>
+                <a:cs typeface="+mn-cs"/>
+              </a:defRPr>
+            </a:lvl6pPr>
+            <a:lvl7pPr marL="2971800" indent="-228600" algn="l" defTabSz="914400" rtl="0" eaLnBrk="1" latinLnBrk="0" hangingPunct="1">
+              <a:lnSpc>
+                <a:spcPct val="90000"/>
+              </a:lnSpc>
+              <a:spcBef>
+                <a:spcPts val="500"/>
+              </a:spcBef>
+              <a:buFont typeface="Arial" panose="020B0604020202020204" pitchFamily="34" charset="0"/>
+              <a:buChar char="•"/>
+              <a:defRPr sz="1800" kern="1200">
+                <a:solidFill>
+                  <a:schemeClr val="tx1"/>
+                </a:solidFill>
+                <a:latin typeface="+mn-lt"/>
+                <a:ea typeface="+mn-ea"/>
+                <a:cs typeface="+mn-cs"/>
+              </a:defRPr>
+            </a:lvl7pPr>
+            <a:lvl8pPr marL="3429000" indent="-228600" algn="l" defTabSz="914400" rtl="0" eaLnBrk="1" latinLnBrk="0" hangingPunct="1">
+              <a:lnSpc>
+                <a:spcPct val="90000"/>
+              </a:lnSpc>
+              <a:spcBef>
+                <a:spcPts val="500"/>
+              </a:spcBef>
+              <a:buFont typeface="Arial" panose="020B0604020202020204" pitchFamily="34" charset="0"/>
+              <a:buChar char="•"/>
+              <a:defRPr sz="1800" kern="1200">
+                <a:solidFill>
+                  <a:schemeClr val="tx1"/>
+                </a:solidFill>
+                <a:latin typeface="+mn-lt"/>
+                <a:ea typeface="+mn-ea"/>
+                <a:cs typeface="+mn-cs"/>
+              </a:defRPr>
+            </a:lvl8pPr>
+            <a:lvl9pPr marL="3886200" indent="-228600" algn="l" defTabSz="914400" rtl="0" eaLnBrk="1" latinLnBrk="0" hangingPunct="1">
+              <a:lnSpc>
+                <a:spcPct val="90000"/>
+              </a:lnSpc>
+              <a:spcBef>
+                <a:spcPts val="500"/>
+              </a:spcBef>
+              <a:buFont typeface="Arial" panose="020B0604020202020204" pitchFamily="34" charset="0"/>
+              <a:buChar char="•"/>
+              <a:defRPr sz="1800" kern="1200">
+                <a:solidFill>
+                  <a:schemeClr val="tx1"/>
+                </a:solidFill>
+                <a:latin typeface="+mn-lt"/>
+                <a:ea typeface="+mn-ea"/>
+                <a:cs typeface="+mn-cs"/>
+              </a:defRPr>
+            </a:lvl9pPr>
+          </a:lstStyle>
+          <a:p>
+            <a:pPr marL="0" indent="0" algn="ctr">
+              <a:buNone/>
+            </a:pPr>
+            <a:r>
+              <a:rPr lang="en-US" sz="1800"/>
+              <a:t>Example power user use case where they consent a self-hosted application to manage the network.</a:t>
+            </a:r>
+            <a:endParaRPr lang="en-US" sz="1800">
+              <a:ea typeface="Calibri"/>
+              <a:cs typeface="Calibri"/>
+            </a:endParaRPr>
+          </a:p>
+        </p:txBody>
+      </p:sp>
+      <p:pic>
+        <p:nvPicPr>
+          <p:cNvPr id="4" name="Picture 3" descr="Diagram of a diagram showing a number of clients&#10;&#10;Description automatically generated">
+            <a:extLst>
+              <a:ext uri="{FF2B5EF4-FFF2-40B4-BE49-F238E27FC236}">
+                <a16:creationId xmlns:a16="http://schemas.microsoft.com/office/drawing/2014/main" id="{E1FF067F-001E-832C-240B-5B53DBDAC07C}"/>
+              </a:ext>
+            </a:extLst>
+          </p:cNvPr>
+          <p:cNvPicPr>
+            <a:picLocks noChangeAspect="1"/>
+          </p:cNvPicPr>
+          <p:nvPr/>
+        </p:nvPicPr>
+        <p:blipFill>
+          <a:blip r:embed="rId3"/>
+          <a:stretch>
+            <a:fillRect/>
+          </a:stretch>
+        </p:blipFill>
+        <p:spPr>
+          <a:xfrm>
+            <a:off x="5801765" y="2095326"/>
+            <a:ext cx="6096000" cy="1268022"/>
+          </a:xfrm>
+          <a:prstGeom prst="rect">
+            <a:avLst/>
+          </a:prstGeom>
+        </p:spPr>
+      </p:pic>
+      <p:pic>
+        <p:nvPicPr>
+          <p:cNvPr id="6" name="Picture 5" descr="Screens screenshot of a computer&#10;&#10;Description automatically generated">
+            <a:extLst>
+              <a:ext uri="{FF2B5EF4-FFF2-40B4-BE49-F238E27FC236}">
+                <a16:creationId xmlns:a16="http://schemas.microsoft.com/office/drawing/2014/main" id="{82E97DCA-CE0D-1FD8-CAAF-DA8CDE1B79C8}"/>
+              </a:ext>
+            </a:extLst>
+          </p:cNvPr>
+          <p:cNvPicPr>
+            <a:picLocks noChangeAspect="1"/>
+          </p:cNvPicPr>
+          <p:nvPr/>
+        </p:nvPicPr>
+        <p:blipFill>
+          <a:blip r:embed="rId4"/>
+          <a:stretch>
+            <a:fillRect/>
+          </a:stretch>
+        </p:blipFill>
+        <p:spPr>
+          <a:xfrm>
+            <a:off x="133772" y="3770242"/>
+            <a:ext cx="8520545" cy="2921329"/>
+          </a:xfrm>
+          <a:prstGeom prst="rect">
+            <a:avLst/>
+          </a:prstGeom>
+        </p:spPr>
+      </p:pic>
+    </p:spTree>
+    <p:extLst>
+      <p:ext uri="{BB962C8B-B14F-4D97-AF65-F5344CB8AC3E}">
+        <p14:creationId xmlns:p14="http://schemas.microsoft.com/office/powerpoint/2010/main" val="2496811614"/>
       </p:ext>
     </p:extLst>
   </p:cSld>
@@ -12251,4 +13963,279 @@
     </a:ext>
   </a:extLst>
 </a:theme>
+</file>
+
+<file path=customXml/item1.xml><?xml version="1.0" encoding="utf-8"?>
+<ct:contentTypeSchema xmlns:ct="http://schemas.microsoft.com/office/2006/metadata/contentType" xmlns:ma="http://schemas.microsoft.com/office/2006/metadata/properties/metaAttributes" ct:_="" ma:_="" ma:contentTypeName="Document" ma:contentTypeID="0x0101004CAAC467ACA742408D00685718CEFA12" ma:contentTypeVersion="12" ma:contentTypeDescription="Create a new document." ma:contentTypeScope="" ma:versionID="d2aa592af97c30a90d9c0a9722745376">
+  <xsd:schema xmlns:xsd="http://www.w3.org/2001/XMLSchema" xmlns:xs="http://www.w3.org/2001/XMLSchema" xmlns:p="http://schemas.microsoft.com/office/2006/metadata/properties" xmlns:ns2="4eccafc8-d4af-4bd1-82e1-b9cab17d93b2" xmlns:ns3="b2ffc30d-9635-4848-8281-2ff694282abe" targetNamespace="http://schemas.microsoft.com/office/2006/metadata/properties" ma:root="true" ma:fieldsID="5c0396a2b8c28eb8f9a4108108802b13" ns2:_="" ns3:_="">
+    <xsd:import namespace="4eccafc8-d4af-4bd1-82e1-b9cab17d93b2"/>
+    <xsd:import namespace="b2ffc30d-9635-4848-8281-2ff694282abe"/>
+    <xsd:element name="properties">
+      <xsd:complexType>
+        <xsd:sequence>
+          <xsd:element name="documentManagement">
+            <xsd:complexType>
+              <xsd:all>
+                <xsd:element ref="ns2:MediaServiceMetadata" minOccurs="0"/>
+                <xsd:element ref="ns2:MediaServiceFastMetadata" minOccurs="0"/>
+                <xsd:element ref="ns2:MediaServiceObjectDetectorVersions" minOccurs="0"/>
+                <xsd:element ref="ns3:SharedWithUsers" minOccurs="0"/>
+                <xsd:element ref="ns3:SharedWithDetails" minOccurs="0"/>
+                <xsd:element ref="ns2:lcf76f155ced4ddcb4097134ff3c332f" minOccurs="0"/>
+                <xsd:element ref="ns3:TaxCatchAll" minOccurs="0"/>
+                <xsd:element ref="ns2:MediaServiceOCR" minOccurs="0"/>
+                <xsd:element ref="ns2:MediaServiceGenerationTime" minOccurs="0"/>
+                <xsd:element ref="ns2:MediaServiceEventHashCode" minOccurs="0"/>
+                <xsd:element ref="ns2:MediaServiceSearchProperties" minOccurs="0"/>
+              </xsd:all>
+            </xsd:complexType>
+          </xsd:element>
+        </xsd:sequence>
+      </xsd:complexType>
+    </xsd:element>
+  </xsd:schema>
+  <xsd:schema xmlns:xsd="http://www.w3.org/2001/XMLSchema" xmlns:xs="http://www.w3.org/2001/XMLSchema" xmlns:dms="http://schemas.microsoft.com/office/2006/documentManagement/types" xmlns:pc="http://schemas.microsoft.com/office/infopath/2007/PartnerControls" targetNamespace="4eccafc8-d4af-4bd1-82e1-b9cab17d93b2" elementFormDefault="qualified">
+    <xsd:import namespace="http://schemas.microsoft.com/office/2006/documentManagement/types"/>
+    <xsd:import namespace="http://schemas.microsoft.com/office/infopath/2007/PartnerControls"/>
+    <xsd:element name="MediaServiceMetadata" ma:index="8" nillable="true" ma:displayName="MediaServiceMetadata" ma:hidden="true" ma:internalName="MediaServiceMetadata" ma:readOnly="true">
+      <xsd:simpleType>
+        <xsd:restriction base="dms:Note"/>
+      </xsd:simpleType>
+    </xsd:element>
+    <xsd:element name="MediaServiceFastMetadata" ma:index="9" nillable="true" ma:displayName="MediaServiceFastMetadata" ma:hidden="true" ma:internalName="MediaServiceFastMetadata" ma:readOnly="true">
+      <xsd:simpleType>
+        <xsd:restriction base="dms:Note"/>
+      </xsd:simpleType>
+    </xsd:element>
+    <xsd:element name="MediaServiceObjectDetectorVersions" ma:index="10" nillable="true" ma:displayName="MediaServiceObjectDetectorVersions" ma:hidden="true" ma:indexed="true" ma:internalName="MediaServiceObjectDetectorVersions" ma:readOnly="true">
+      <xsd:simpleType>
+        <xsd:restriction base="dms:Text"/>
+      </xsd:simpleType>
+    </xsd:element>
+    <xsd:element name="lcf76f155ced4ddcb4097134ff3c332f" ma:index="14" nillable="true" ma:taxonomy="true" ma:internalName="lcf76f155ced4ddcb4097134ff3c332f" ma:taxonomyFieldName="MediaServiceImageTags" ma:displayName="Image Tags" ma:readOnly="false" ma:fieldId="{5cf76f15-5ced-4ddc-b409-7134ff3c332f}" ma:taxonomyMulti="true" ma:sspId="600d62cf-6361-4bdf-91d1-d22d0aee0dbf" ma:termSetId="09814cd3-568e-fe90-9814-8d621ff8fb84" ma:anchorId="fba54fb3-c3e1-fe81-a776-ca4b69148c4d" ma:open="true" ma:isKeyword="false">
+      <xsd:complexType>
+        <xsd:sequence>
+          <xsd:element ref="pc:Terms" minOccurs="0" maxOccurs="1"/>
+        </xsd:sequence>
+      </xsd:complexType>
+    </xsd:element>
+    <xsd:element name="MediaServiceOCR" ma:index="16" nillable="true" ma:displayName="Extracted Text" ma:internalName="MediaServiceOCR" ma:readOnly="true">
+      <xsd:simpleType>
+        <xsd:restriction base="dms:Note">
+          <xsd:maxLength value="255"/>
+        </xsd:restriction>
+      </xsd:simpleType>
+    </xsd:element>
+    <xsd:element name="MediaServiceGenerationTime" ma:index="17" nillable="true" ma:displayName="MediaServiceGenerationTime" ma:hidden="true" ma:internalName="MediaServiceGenerationTime" ma:readOnly="true">
+      <xsd:simpleType>
+        <xsd:restriction base="dms:Text"/>
+      </xsd:simpleType>
+    </xsd:element>
+    <xsd:element name="MediaServiceEventHashCode" ma:index="18" nillable="true" ma:displayName="MediaServiceEventHashCode" ma:hidden="true" ma:internalName="MediaServiceEventHashCode" ma:readOnly="true">
+      <xsd:simpleType>
+        <xsd:restriction base="dms:Text"/>
+      </xsd:simpleType>
+    </xsd:element>
+    <xsd:element name="MediaServiceSearchProperties" ma:index="19" nillable="true" ma:displayName="MediaServiceSearchProperties" ma:hidden="true" ma:internalName="MediaServiceSearchProperties" ma:readOnly="true">
+      <xsd:simpleType>
+        <xsd:restriction base="dms:Note"/>
+      </xsd:simpleType>
+    </xsd:element>
+  </xsd:schema>
+  <xsd:schema xmlns:xsd="http://www.w3.org/2001/XMLSchema" xmlns:xs="http://www.w3.org/2001/XMLSchema" xmlns:dms="http://schemas.microsoft.com/office/2006/documentManagement/types" xmlns:pc="http://schemas.microsoft.com/office/infopath/2007/PartnerControls" targetNamespace="b2ffc30d-9635-4848-8281-2ff694282abe" elementFormDefault="qualified">
+    <xsd:import namespace="http://schemas.microsoft.com/office/2006/documentManagement/types"/>
+    <xsd:import namespace="http://schemas.microsoft.com/office/infopath/2007/PartnerControls"/>
+    <xsd:element name="SharedWithUsers" ma:index="11" nillable="true" ma:displayName="Shared With" ma:internalName="SharedWithUsers" ma:readOnly="true">
+      <xsd:complexType>
+        <xsd:complexContent>
+          <xsd:extension base="dms:UserMulti">
+            <xsd:sequence>
+              <xsd:element name="UserInfo" minOccurs="0" maxOccurs="unbounded">
+                <xsd:complexType>
+                  <xsd:sequence>
+                    <xsd:element name="DisplayName" type="xsd:string" minOccurs="0"/>
+                    <xsd:element name="AccountId" type="dms:UserId" minOccurs="0" nillable="true"/>
+                    <xsd:element name="AccountType" type="xsd:string" minOccurs="0"/>
+                  </xsd:sequence>
+                </xsd:complexType>
+              </xsd:element>
+            </xsd:sequence>
+          </xsd:extension>
+        </xsd:complexContent>
+      </xsd:complexType>
+    </xsd:element>
+    <xsd:element name="SharedWithDetails" ma:index="12" nillable="true" ma:displayName="Shared With Details" ma:internalName="SharedWithDetails" ma:readOnly="true">
+      <xsd:simpleType>
+        <xsd:restriction base="dms:Note">
+          <xsd:maxLength value="255"/>
+        </xsd:restriction>
+      </xsd:simpleType>
+    </xsd:element>
+    <xsd:element name="TaxCatchAll" ma:index="15" nillable="true" ma:displayName="Taxonomy Catch All Column" ma:hidden="true" ma:list="{86c59d0c-6784-477a-a80d-6212b9b78017}" ma:internalName="TaxCatchAll" ma:showField="CatchAllData" ma:web="b2ffc30d-9635-4848-8281-2ff694282abe">
+      <xsd:complexType>
+        <xsd:complexContent>
+          <xsd:extension base="dms:MultiChoiceLookup">
+            <xsd:sequence>
+              <xsd:element name="Value" type="dms:Lookup" maxOccurs="unbounded" minOccurs="0" nillable="true"/>
+            </xsd:sequence>
+          </xsd:extension>
+        </xsd:complexContent>
+      </xsd:complexType>
+    </xsd:element>
+  </xsd:schema>
+  <xsd:schema xmlns="http://schemas.openxmlformats.org/package/2006/metadata/core-properties" xmlns:xsd="http://www.w3.org/2001/XMLSchema" xmlns:xsi="http://www.w3.org/2001/XMLSchema-instance" xmlns:dc="http://purl.org/dc/elements/1.1/" xmlns:dcterms="http://purl.org/dc/terms/" xmlns:odoc="http://schemas.microsoft.com/internal/obd" targetNamespace="http://schemas.openxmlformats.org/package/2006/metadata/core-properties" elementFormDefault="qualified" attributeFormDefault="unqualified" blockDefault="#all">
+    <xsd:import namespace="http://purl.org/dc/elements/1.1/" schemaLocation="http://dublincore.org/schemas/xmls/qdc/2003/04/02/dc.xsd"/>
+    <xsd:import namespace="http://purl.org/dc/terms/" schemaLocation="http://dublincore.org/schemas/xmls/qdc/2003/04/02/dcterms.xsd"/>
+    <xsd:element name="coreProperties" type="CT_coreProperties"/>
+    <xsd:complexType name="CT_coreProperties">
+      <xsd:all>
+        <xsd:element ref="dc:creator" minOccurs="0" maxOccurs="1"/>
+        <xsd:element ref="dcterms:created" minOccurs="0" maxOccurs="1"/>
+        <xsd:element ref="dc:identifier" minOccurs="0" maxOccurs="1"/>
+        <xsd:element name="contentType" minOccurs="0" maxOccurs="1" type="xsd:string" ma:index="0" ma:displayName="Content Type"/>
+        <xsd:element ref="dc:title" minOccurs="0" maxOccurs="1" ma:index="4" ma:displayName="Title"/>
+        <xsd:element ref="dc:subject" minOccurs="0" maxOccurs="1"/>
+        <xsd:element ref="dc:description" minOccurs="0" maxOccurs="1"/>
+        <xsd:element name="keywords" minOccurs="0" maxOccurs="1" type="xsd:string"/>
+        <xsd:element ref="dc:language" minOccurs="0" maxOccurs="1"/>
+        <xsd:element name="category" minOccurs="0" maxOccurs="1" type="xsd:string"/>
+        <xsd:element name="version" minOccurs="0" maxOccurs="1" type="xsd:string"/>
+        <xsd:element name="revision" minOccurs="0" maxOccurs="1" type="xsd:string">
+          <xsd:annotation>
+            <xsd:documentation>
+                        This value indicates the number of saves or revisions. The application is responsible for updating this value after each revision.
+                    </xsd:documentation>
+          </xsd:annotation>
+        </xsd:element>
+        <xsd:element name="lastModifiedBy" minOccurs="0" maxOccurs="1" type="xsd:string"/>
+        <xsd:element ref="dcterms:modified" minOccurs="0" maxOccurs="1"/>
+        <xsd:element name="contentStatus" minOccurs="0" maxOccurs="1" type="xsd:string"/>
+      </xsd:all>
+    </xsd:complexType>
+  </xsd:schema>
+  <xs:schema xmlns:pc="http://schemas.microsoft.com/office/infopath/2007/PartnerControls" xmlns:xs="http://www.w3.org/2001/XMLSchema" targetNamespace="http://schemas.microsoft.com/office/infopath/2007/PartnerControls" elementFormDefault="qualified" attributeFormDefault="unqualified">
+    <xs:element name="Person">
+      <xs:complexType>
+        <xs:sequence>
+          <xs:element ref="pc:DisplayName" minOccurs="0"/>
+          <xs:element ref="pc:AccountId" minOccurs="0"/>
+          <xs:element ref="pc:AccountType" minOccurs="0"/>
+        </xs:sequence>
+      </xs:complexType>
+    </xs:element>
+    <xs:element name="DisplayName" type="xs:string"/>
+    <xs:element name="AccountId" type="xs:string"/>
+    <xs:element name="AccountType" type="xs:string"/>
+    <xs:element name="BDCAssociatedEntity">
+      <xs:complexType>
+        <xs:sequence>
+          <xs:element ref="pc:BDCEntity" minOccurs="0" maxOccurs="unbounded"/>
+        </xs:sequence>
+        <xs:attribute ref="pc:EntityNamespace"/>
+        <xs:attribute ref="pc:EntityName"/>
+        <xs:attribute ref="pc:SystemInstanceName"/>
+        <xs:attribute ref="pc:AssociationName"/>
+      </xs:complexType>
+    </xs:element>
+    <xs:attribute name="EntityNamespace" type="xs:string"/>
+    <xs:attribute name="EntityName" type="xs:string"/>
+    <xs:attribute name="SystemInstanceName" type="xs:string"/>
+    <xs:attribute name="AssociationName" type="xs:string"/>
+    <xs:element name="BDCEntity">
+      <xs:complexType>
+        <xs:sequence>
+          <xs:element ref="pc:EntityDisplayName" minOccurs="0"/>
+          <xs:element ref="pc:EntityInstanceReference" minOccurs="0"/>
+          <xs:element ref="pc:EntityId1" minOccurs="0"/>
+          <xs:element ref="pc:EntityId2" minOccurs="0"/>
+          <xs:element ref="pc:EntityId3" minOccurs="0"/>
+          <xs:element ref="pc:EntityId4" minOccurs="0"/>
+          <xs:element ref="pc:EntityId5" minOccurs="0"/>
+        </xs:sequence>
+      </xs:complexType>
+    </xs:element>
+    <xs:element name="EntityDisplayName" type="xs:string"/>
+    <xs:element name="EntityInstanceReference" type="xs:string"/>
+    <xs:element name="EntityId1" type="xs:string"/>
+    <xs:element name="EntityId2" type="xs:string"/>
+    <xs:element name="EntityId3" type="xs:string"/>
+    <xs:element name="EntityId4" type="xs:string"/>
+    <xs:element name="EntityId5" type="xs:string"/>
+    <xs:element name="Terms">
+      <xs:complexType>
+        <xs:sequence>
+          <xs:element ref="pc:TermInfo" minOccurs="0" maxOccurs="unbounded"/>
+        </xs:sequence>
+      </xs:complexType>
+    </xs:element>
+    <xs:element name="TermInfo">
+      <xs:complexType>
+        <xs:sequence>
+          <xs:element ref="pc:TermName" minOccurs="0"/>
+          <xs:element ref="pc:TermId" minOccurs="0"/>
+        </xs:sequence>
+      </xs:complexType>
+    </xs:element>
+    <xs:element name="TermName" type="xs:string"/>
+    <xs:element name="TermId" type="xs:string"/>
+  </xs:schema>
+</ct:contentTypeSchema>
+</file>
+
+<file path=customXml/item2.xml><?xml version="1.0" encoding="utf-8"?>
+<p:properties xmlns:p="http://schemas.microsoft.com/office/2006/metadata/properties" xmlns:xsi="http://www.w3.org/2001/XMLSchema-instance" xmlns:pc="http://schemas.microsoft.com/office/infopath/2007/PartnerControls">
+  <documentManagement>
+    <TaxCatchAll xmlns="b2ffc30d-9635-4848-8281-2ff694282abe" xsi:nil="true"/>
+    <lcf76f155ced4ddcb4097134ff3c332f xmlns="4eccafc8-d4af-4bd1-82e1-b9cab17d93b2">
+      <Terms xmlns="http://schemas.microsoft.com/office/infopath/2007/PartnerControls"/>
+    </lcf76f155ced4ddcb4097134ff3c332f>
+  </documentManagement>
+</p:properties>
+</file>
+
+<file path=customXml/item3.xml><?xml version="1.0" encoding="utf-8"?>
+<?mso-contentType ?>
+<FormTemplates xmlns="http://schemas.microsoft.com/sharepoint/v3/contenttype/forms">
+  <Display>DocumentLibraryForm</Display>
+  <Edit>DocumentLibraryForm</Edit>
+  <New>DocumentLibraryForm</New>
+</FormTemplates>
+</file>
+
+<file path=customXml/itemProps1.xml><?xml version="1.0" encoding="utf-8"?>
+<ds:datastoreItem xmlns:ds="http://schemas.openxmlformats.org/officeDocument/2006/customXml" ds:itemID="{62C12BB3-45DD-40F6-8B07-62F4E400C5BD}">
+  <ds:schemaRefs>
+    <ds:schemaRef ds:uri="4eccafc8-d4af-4bd1-82e1-b9cab17d93b2"/>
+    <ds:schemaRef ds:uri="b2ffc30d-9635-4848-8281-2ff694282abe"/>
+    <ds:schemaRef ds:uri="http://purl.org/dc/elements/1.1/"/>
+    <ds:schemaRef ds:uri="http://purl.org/dc/terms/"/>
+    <ds:schemaRef ds:uri="http://schemas.microsoft.com/internal/obd"/>
+    <ds:schemaRef ds:uri="http://schemas.microsoft.com/office/2006/documentManagement/types"/>
+    <ds:schemaRef ds:uri="http://schemas.microsoft.com/office/2006/metadata/contentType"/>
+    <ds:schemaRef ds:uri="http://schemas.microsoft.com/office/2006/metadata/properties"/>
+    <ds:schemaRef ds:uri="http://schemas.microsoft.com/office/2006/metadata/properties/metaAttributes"/>
+    <ds:schemaRef ds:uri="http://schemas.microsoft.com/office/infopath/2007/PartnerControls"/>
+    <ds:schemaRef ds:uri="http://schemas.openxmlformats.org/package/2006/metadata/core-properties"/>
+    <ds:schemaRef ds:uri="http://www.w3.org/2001/XMLSchema"/>
+  </ds:schemaRefs>
+</ds:datastoreItem>
+</file>
+
+<file path=customXml/itemProps2.xml><?xml version="1.0" encoding="utf-8"?>
+<ds:datastoreItem xmlns:ds="http://schemas.openxmlformats.org/officeDocument/2006/customXml" ds:itemID="{5A0E1417-4BB4-4C15-AD6C-0A08B817C1EA}">
+  <ds:schemaRefs>
+    <ds:schemaRef ds:uri="4eccafc8-d4af-4bd1-82e1-b9cab17d93b2"/>
+    <ds:schemaRef ds:uri="b2ffc30d-9635-4848-8281-2ff694282abe"/>
+    <ds:schemaRef ds:uri="http://schemas.microsoft.com/office/2006/metadata/properties"/>
+    <ds:schemaRef ds:uri="http://schemas.microsoft.com/office/infopath/2007/PartnerControls"/>
+  </ds:schemaRefs>
+</ds:datastoreItem>
+</file>
+
+<file path=customXml/itemProps3.xml><?xml version="1.0" encoding="utf-8"?>
+<ds:datastoreItem xmlns:ds="http://schemas.openxmlformats.org/officeDocument/2006/customXml" ds:itemID="{3F1EA4E6-3944-4B25-B1F3-9978CCA9EFF9}">
+  <ds:schemaRefs>
+    <ds:schemaRef ds:uri="http://schemas.microsoft.com/sharepoint/v3/contenttype/forms"/>
+  </ds:schemaRefs>
+</ds:datastoreItem>
 </file>
</xml_diff>